<commit_message>
modified documents against review comments #18
</commit_message>
<xml_diff>
--- a/function/素材/BL-06.pptx
+++ b/function/素材/BL-06.pptx
@@ -4,8 +4,11 @@
   <p:sldMasterIdLst>
     <p:sldMasterId id="2147483648" r:id="rId1"/>
   </p:sldMasterIdLst>
+  <p:notesMasterIdLst>
+    <p:notesMasterId r:id="rId3"/>
+  </p:notesMasterIdLst>
   <p:sldIdLst>
-    <p:sldId id="258" r:id="rId2"/>
+    <p:sldId id="263" r:id="rId2"/>
   </p:sldIdLst>
   <p:sldSz cx="9144000" cy="6858000" type="screen4x3"/>
   <p:notesSz cx="6858000" cy="9144000"/>
@@ -104,7 +107,484 @@
       </a:defRPr>
     </a:lvl9pPr>
   </p:defaultTextStyle>
+  <p:extLst>
+    <p:ext uri="{521415D9-36F7-43E2-AB2F-B90AF26B5E84}">
+      <p14:sectionLst xmlns:p14="http://schemas.microsoft.com/office/powerpoint/2010/main">
+        <p14:section name="概念図" id="{9EEB85A0-7999-4F27-9F84-252B83477139}">
+          <p14:sldIdLst>
+            <p14:sldId id="263"/>
+          </p14:sldIdLst>
+        </p14:section>
+      </p14:sectionLst>
+    </p:ext>
+  </p:extLst>
 </p:presentation>
+</file>
+
+<file path=ppt/notesMasters/notesMaster1.xml><?xml version="1.0" encoding="utf-8"?>
+<p:notesMaster xmlns:a="http://schemas.openxmlformats.org/drawingml/2006/main" xmlns:r="http://schemas.openxmlformats.org/officeDocument/2006/relationships" xmlns:p="http://schemas.openxmlformats.org/presentationml/2006/main">
+  <p:cSld>
+    <p:bg>
+      <p:bgRef idx="1001">
+        <a:schemeClr val="bg1"/>
+      </p:bgRef>
+    </p:bg>
+    <p:spTree>
+      <p:nvGrpSpPr>
+        <p:cNvPr id="1" name=""/>
+        <p:cNvGrpSpPr/>
+        <p:nvPr/>
+      </p:nvGrpSpPr>
+      <p:grpSpPr>
+        <a:xfrm>
+          <a:off x="0" y="0"/>
+          <a:ext cx="0" cy="0"/>
+          <a:chOff x="0" y="0"/>
+          <a:chExt cx="0" cy="0"/>
+        </a:xfrm>
+      </p:grpSpPr>
+      <p:sp>
+        <p:nvSpPr>
+          <p:cNvPr id="2" name="ヘッダー プレースホルダー 1"/>
+          <p:cNvSpPr>
+            <a:spLocks noGrp="1"/>
+          </p:cNvSpPr>
+          <p:nvPr>
+            <p:ph type="hdr" sz="quarter"/>
+          </p:nvPr>
+        </p:nvSpPr>
+        <p:spPr>
+          <a:xfrm>
+            <a:off x="0" y="0"/>
+            <a:ext cx="2971800" cy="457200"/>
+          </a:xfrm>
+          <a:prstGeom prst="rect">
+            <a:avLst/>
+          </a:prstGeom>
+        </p:spPr>
+        <p:txBody>
+          <a:bodyPr vert="horz" lIns="91440" tIns="45720" rIns="91440" bIns="45720" rtlCol="0"/>
+          <a:lstStyle>
+            <a:lvl1pPr algn="l">
+              <a:defRPr sz="1200"/>
+            </a:lvl1pPr>
+          </a:lstStyle>
+          <a:p>
+            <a:endParaRPr kumimoji="1" lang="ja-JP" altLang="en-US"/>
+          </a:p>
+        </p:txBody>
+      </p:sp>
+      <p:sp>
+        <p:nvSpPr>
+          <p:cNvPr id="3" name="日付プレースホルダー 2"/>
+          <p:cNvSpPr>
+            <a:spLocks noGrp="1"/>
+          </p:cNvSpPr>
+          <p:nvPr>
+            <p:ph type="dt" idx="1"/>
+          </p:nvPr>
+        </p:nvSpPr>
+        <p:spPr>
+          <a:xfrm>
+            <a:off x="3884613" y="0"/>
+            <a:ext cx="2971800" cy="457200"/>
+          </a:xfrm>
+          <a:prstGeom prst="rect">
+            <a:avLst/>
+          </a:prstGeom>
+        </p:spPr>
+        <p:txBody>
+          <a:bodyPr vert="horz" lIns="91440" tIns="45720" rIns="91440" bIns="45720" rtlCol="0"/>
+          <a:lstStyle>
+            <a:lvl1pPr algn="r">
+              <a:defRPr sz="1200"/>
+            </a:lvl1pPr>
+          </a:lstStyle>
+          <a:p>
+            <a:fld id="{F000A796-D3D2-413B-8702-10C8492D5263}" type="datetimeFigureOut">
+              <a:rPr kumimoji="1" lang="ja-JP" altLang="en-US" smtClean="0"/>
+              <a:t>2015/2/2</a:t>
+            </a:fld>
+            <a:endParaRPr kumimoji="1" lang="ja-JP" altLang="en-US"/>
+          </a:p>
+        </p:txBody>
+      </p:sp>
+      <p:sp>
+        <p:nvSpPr>
+          <p:cNvPr id="4" name="スライド イメージ プレースホルダー 3"/>
+          <p:cNvSpPr>
+            <a:spLocks noGrp="1" noRot="1" noChangeAspect="1"/>
+          </p:cNvSpPr>
+          <p:nvPr>
+            <p:ph type="sldImg" idx="2"/>
+          </p:nvPr>
+        </p:nvSpPr>
+        <p:spPr>
+          <a:xfrm>
+            <a:off x="1143000" y="685800"/>
+            <a:ext cx="4572000" cy="3429000"/>
+          </a:xfrm>
+          <a:prstGeom prst="rect">
+            <a:avLst/>
+          </a:prstGeom>
+          <a:noFill/>
+          <a:ln w="12700">
+            <a:solidFill>
+              <a:prstClr val="black"/>
+            </a:solidFill>
+          </a:ln>
+        </p:spPr>
+        <p:txBody>
+          <a:bodyPr vert="horz" lIns="91440" tIns="45720" rIns="91440" bIns="45720" rtlCol="0" anchor="ctr"/>
+          <a:lstStyle/>
+          <a:p>
+            <a:endParaRPr lang="ja-JP" altLang="en-US"/>
+          </a:p>
+        </p:txBody>
+      </p:sp>
+      <p:sp>
+        <p:nvSpPr>
+          <p:cNvPr id="5" name="ノート プレースホルダー 4"/>
+          <p:cNvSpPr>
+            <a:spLocks noGrp="1"/>
+          </p:cNvSpPr>
+          <p:nvPr>
+            <p:ph type="body" sz="quarter" idx="3"/>
+          </p:nvPr>
+        </p:nvSpPr>
+        <p:spPr>
+          <a:xfrm>
+            <a:off x="685800" y="4343400"/>
+            <a:ext cx="5486400" cy="4114800"/>
+          </a:xfrm>
+          <a:prstGeom prst="rect">
+            <a:avLst/>
+          </a:prstGeom>
+        </p:spPr>
+        <p:txBody>
+          <a:bodyPr vert="horz" lIns="91440" tIns="45720" rIns="91440" bIns="45720" rtlCol="0"/>
+          <a:lstStyle/>
+          <a:p>
+            <a:pPr lvl="0"/>
+            <a:r>
+              <a:rPr kumimoji="1" lang="ja-JP" altLang="en-US" smtClean="0"/>
+              <a:t>マスター テキストの書式設定</a:t>
+            </a:r>
+          </a:p>
+          <a:p>
+            <a:pPr lvl="1"/>
+            <a:r>
+              <a:rPr kumimoji="1" lang="ja-JP" altLang="en-US" smtClean="0"/>
+              <a:t>第 </a:t>
+            </a:r>
+            <a:r>
+              <a:rPr kumimoji="1" lang="en-US" altLang="ja-JP" smtClean="0"/>
+              <a:t>2 </a:t>
+            </a:r>
+            <a:r>
+              <a:rPr kumimoji="1" lang="ja-JP" altLang="en-US" smtClean="0"/>
+              <a:t>レベル</a:t>
+            </a:r>
+          </a:p>
+          <a:p>
+            <a:pPr lvl="2"/>
+            <a:r>
+              <a:rPr kumimoji="1" lang="ja-JP" altLang="en-US" smtClean="0"/>
+              <a:t>第 </a:t>
+            </a:r>
+            <a:r>
+              <a:rPr kumimoji="1" lang="en-US" altLang="ja-JP" smtClean="0"/>
+              <a:t>3 </a:t>
+            </a:r>
+            <a:r>
+              <a:rPr kumimoji="1" lang="ja-JP" altLang="en-US" smtClean="0"/>
+              <a:t>レベル</a:t>
+            </a:r>
+          </a:p>
+          <a:p>
+            <a:pPr lvl="3"/>
+            <a:r>
+              <a:rPr kumimoji="1" lang="ja-JP" altLang="en-US" smtClean="0"/>
+              <a:t>第 </a:t>
+            </a:r>
+            <a:r>
+              <a:rPr kumimoji="1" lang="en-US" altLang="ja-JP" smtClean="0"/>
+              <a:t>4 </a:t>
+            </a:r>
+            <a:r>
+              <a:rPr kumimoji="1" lang="ja-JP" altLang="en-US" smtClean="0"/>
+              <a:t>レベル</a:t>
+            </a:r>
+          </a:p>
+          <a:p>
+            <a:pPr lvl="4"/>
+            <a:r>
+              <a:rPr kumimoji="1" lang="ja-JP" altLang="en-US" smtClean="0"/>
+              <a:t>第 </a:t>
+            </a:r>
+            <a:r>
+              <a:rPr kumimoji="1" lang="en-US" altLang="ja-JP" smtClean="0"/>
+              <a:t>5 </a:t>
+            </a:r>
+            <a:r>
+              <a:rPr kumimoji="1" lang="ja-JP" altLang="en-US" smtClean="0"/>
+              <a:t>レベル</a:t>
+            </a:r>
+            <a:endParaRPr kumimoji="1" lang="ja-JP" altLang="en-US"/>
+          </a:p>
+        </p:txBody>
+      </p:sp>
+      <p:sp>
+        <p:nvSpPr>
+          <p:cNvPr id="6" name="フッター プレースホルダー 5"/>
+          <p:cNvSpPr>
+            <a:spLocks noGrp="1"/>
+          </p:cNvSpPr>
+          <p:nvPr>
+            <p:ph type="ftr" sz="quarter" idx="4"/>
+          </p:nvPr>
+        </p:nvSpPr>
+        <p:spPr>
+          <a:xfrm>
+            <a:off x="0" y="8685213"/>
+            <a:ext cx="2971800" cy="457200"/>
+          </a:xfrm>
+          <a:prstGeom prst="rect">
+            <a:avLst/>
+          </a:prstGeom>
+        </p:spPr>
+        <p:txBody>
+          <a:bodyPr vert="horz" lIns="91440" tIns="45720" rIns="91440" bIns="45720" rtlCol="0" anchor="b"/>
+          <a:lstStyle>
+            <a:lvl1pPr algn="l">
+              <a:defRPr sz="1200"/>
+            </a:lvl1pPr>
+          </a:lstStyle>
+          <a:p>
+            <a:endParaRPr kumimoji="1" lang="ja-JP" altLang="en-US"/>
+          </a:p>
+        </p:txBody>
+      </p:sp>
+      <p:sp>
+        <p:nvSpPr>
+          <p:cNvPr id="7" name="スライド番号プレースホルダー 6"/>
+          <p:cNvSpPr>
+            <a:spLocks noGrp="1"/>
+          </p:cNvSpPr>
+          <p:nvPr>
+            <p:ph type="sldNum" sz="quarter" idx="5"/>
+          </p:nvPr>
+        </p:nvSpPr>
+        <p:spPr>
+          <a:xfrm>
+            <a:off x="3884613" y="8685213"/>
+            <a:ext cx="2971800" cy="457200"/>
+          </a:xfrm>
+          <a:prstGeom prst="rect">
+            <a:avLst/>
+          </a:prstGeom>
+        </p:spPr>
+        <p:txBody>
+          <a:bodyPr vert="horz" lIns="91440" tIns="45720" rIns="91440" bIns="45720" rtlCol="0" anchor="b"/>
+          <a:lstStyle>
+            <a:lvl1pPr algn="r">
+              <a:defRPr sz="1200"/>
+            </a:lvl1pPr>
+          </a:lstStyle>
+          <a:p>
+            <a:fld id="{119E5E77-5CC0-4F26-ADCB-6ED0ED2C2CFF}" type="slidenum">
+              <a:rPr kumimoji="1" lang="ja-JP" altLang="en-US" smtClean="0"/>
+              <a:t>‹#›</a:t>
+            </a:fld>
+            <a:endParaRPr kumimoji="1" lang="ja-JP" altLang="en-US"/>
+          </a:p>
+        </p:txBody>
+      </p:sp>
+    </p:spTree>
+    <p:extLst>
+      <p:ext uri="{BB962C8B-B14F-4D97-AF65-F5344CB8AC3E}">
+        <p14:creationId xmlns:p14="http://schemas.microsoft.com/office/powerpoint/2010/main" val="2309957304"/>
+      </p:ext>
+    </p:extLst>
+  </p:cSld>
+  <p:clrMap bg1="lt1" tx1="dk1" bg2="lt2" tx2="dk2" accent1="accent1" accent2="accent2" accent3="accent3" accent4="accent4" accent5="accent5" accent6="accent6" hlink="hlink" folHlink="folHlink"/>
+  <p:notesStyle>
+    <a:lvl1pPr marL="0" algn="l" defTabSz="914400" rtl="0" eaLnBrk="1" latinLnBrk="0" hangingPunct="1">
+      <a:defRPr kumimoji="1" sz="1200" kern="1200">
+        <a:solidFill>
+          <a:schemeClr val="tx1"/>
+        </a:solidFill>
+        <a:latin typeface="+mn-lt"/>
+        <a:ea typeface="+mn-ea"/>
+        <a:cs typeface="+mn-cs"/>
+      </a:defRPr>
+    </a:lvl1pPr>
+    <a:lvl2pPr marL="457200" algn="l" defTabSz="914400" rtl="0" eaLnBrk="1" latinLnBrk="0" hangingPunct="1">
+      <a:defRPr kumimoji="1" sz="1200" kern="1200">
+        <a:solidFill>
+          <a:schemeClr val="tx1"/>
+        </a:solidFill>
+        <a:latin typeface="+mn-lt"/>
+        <a:ea typeface="+mn-ea"/>
+        <a:cs typeface="+mn-cs"/>
+      </a:defRPr>
+    </a:lvl2pPr>
+    <a:lvl3pPr marL="914400" algn="l" defTabSz="914400" rtl="0" eaLnBrk="1" latinLnBrk="0" hangingPunct="1">
+      <a:defRPr kumimoji="1" sz="1200" kern="1200">
+        <a:solidFill>
+          <a:schemeClr val="tx1"/>
+        </a:solidFill>
+        <a:latin typeface="+mn-lt"/>
+        <a:ea typeface="+mn-ea"/>
+        <a:cs typeface="+mn-cs"/>
+      </a:defRPr>
+    </a:lvl3pPr>
+    <a:lvl4pPr marL="1371600" algn="l" defTabSz="914400" rtl="0" eaLnBrk="1" latinLnBrk="0" hangingPunct="1">
+      <a:defRPr kumimoji="1" sz="1200" kern="1200">
+        <a:solidFill>
+          <a:schemeClr val="tx1"/>
+        </a:solidFill>
+        <a:latin typeface="+mn-lt"/>
+        <a:ea typeface="+mn-ea"/>
+        <a:cs typeface="+mn-cs"/>
+      </a:defRPr>
+    </a:lvl4pPr>
+    <a:lvl5pPr marL="1828800" algn="l" defTabSz="914400" rtl="0" eaLnBrk="1" latinLnBrk="0" hangingPunct="1">
+      <a:defRPr kumimoji="1" sz="1200" kern="1200">
+        <a:solidFill>
+          <a:schemeClr val="tx1"/>
+        </a:solidFill>
+        <a:latin typeface="+mn-lt"/>
+        <a:ea typeface="+mn-ea"/>
+        <a:cs typeface="+mn-cs"/>
+      </a:defRPr>
+    </a:lvl5pPr>
+    <a:lvl6pPr marL="2286000" algn="l" defTabSz="914400" rtl="0" eaLnBrk="1" latinLnBrk="0" hangingPunct="1">
+      <a:defRPr kumimoji="1" sz="1200" kern="1200">
+        <a:solidFill>
+          <a:schemeClr val="tx1"/>
+        </a:solidFill>
+        <a:latin typeface="+mn-lt"/>
+        <a:ea typeface="+mn-ea"/>
+        <a:cs typeface="+mn-cs"/>
+      </a:defRPr>
+    </a:lvl6pPr>
+    <a:lvl7pPr marL="2743200" algn="l" defTabSz="914400" rtl="0" eaLnBrk="1" latinLnBrk="0" hangingPunct="1">
+      <a:defRPr kumimoji="1" sz="1200" kern="1200">
+        <a:solidFill>
+          <a:schemeClr val="tx1"/>
+        </a:solidFill>
+        <a:latin typeface="+mn-lt"/>
+        <a:ea typeface="+mn-ea"/>
+        <a:cs typeface="+mn-cs"/>
+      </a:defRPr>
+    </a:lvl7pPr>
+    <a:lvl8pPr marL="3200400" algn="l" defTabSz="914400" rtl="0" eaLnBrk="1" latinLnBrk="0" hangingPunct="1">
+      <a:defRPr kumimoji="1" sz="1200" kern="1200">
+        <a:solidFill>
+          <a:schemeClr val="tx1"/>
+        </a:solidFill>
+        <a:latin typeface="+mn-lt"/>
+        <a:ea typeface="+mn-ea"/>
+        <a:cs typeface="+mn-cs"/>
+      </a:defRPr>
+    </a:lvl8pPr>
+    <a:lvl9pPr marL="3657600" algn="l" defTabSz="914400" rtl="0" eaLnBrk="1" latinLnBrk="0" hangingPunct="1">
+      <a:defRPr kumimoji="1" sz="1200" kern="1200">
+        <a:solidFill>
+          <a:schemeClr val="tx1"/>
+        </a:solidFill>
+        <a:latin typeface="+mn-lt"/>
+        <a:ea typeface="+mn-ea"/>
+        <a:cs typeface="+mn-cs"/>
+      </a:defRPr>
+    </a:lvl9pPr>
+  </p:notesStyle>
+</p:notesMaster>
+</file>
+
+<file path=ppt/notesSlides/notesSlide1.xml><?xml version="1.0" encoding="utf-8"?>
+<p:notes xmlns:a="http://schemas.openxmlformats.org/drawingml/2006/main" xmlns:r="http://schemas.openxmlformats.org/officeDocument/2006/relationships" xmlns:p="http://schemas.openxmlformats.org/presentationml/2006/main">
+  <p:cSld>
+    <p:spTree>
+      <p:nvGrpSpPr>
+        <p:cNvPr id="1" name=""/>
+        <p:cNvGrpSpPr/>
+        <p:nvPr/>
+      </p:nvGrpSpPr>
+      <p:grpSpPr>
+        <a:xfrm>
+          <a:off x="0" y="0"/>
+          <a:ext cx="0" cy="0"/>
+          <a:chOff x="0" y="0"/>
+          <a:chExt cx="0" cy="0"/>
+        </a:xfrm>
+      </p:grpSpPr>
+      <p:sp>
+        <p:nvSpPr>
+          <p:cNvPr id="2" name="スライド イメージ プレースホルダー 1"/>
+          <p:cNvSpPr>
+            <a:spLocks noGrp="1" noRot="1" noChangeAspect="1"/>
+          </p:cNvSpPr>
+          <p:nvPr>
+            <p:ph type="sldImg"/>
+          </p:nvPr>
+        </p:nvSpPr>
+        <p:spPr/>
+      </p:sp>
+      <p:sp>
+        <p:nvSpPr>
+          <p:cNvPr id="3" name="ノート プレースホルダー 2"/>
+          <p:cNvSpPr>
+            <a:spLocks noGrp="1"/>
+          </p:cNvSpPr>
+          <p:nvPr>
+            <p:ph type="body" idx="1"/>
+          </p:nvPr>
+        </p:nvSpPr>
+        <p:spPr/>
+        <p:txBody>
+          <a:bodyPr/>
+          <a:lstStyle/>
+          <a:p>
+            <a:endParaRPr kumimoji="1" lang="ja-JP" altLang="en-US" dirty="0"/>
+          </a:p>
+        </p:txBody>
+      </p:sp>
+      <p:sp>
+        <p:nvSpPr>
+          <p:cNvPr id="4" name="スライド番号プレースホルダー 3"/>
+          <p:cNvSpPr>
+            <a:spLocks noGrp="1"/>
+          </p:cNvSpPr>
+          <p:nvPr>
+            <p:ph type="sldNum" sz="quarter" idx="10"/>
+          </p:nvPr>
+        </p:nvSpPr>
+        <p:spPr/>
+        <p:txBody>
+          <a:bodyPr/>
+          <a:lstStyle/>
+          <a:p>
+            <a:fld id="{119E5E77-5CC0-4F26-ADCB-6ED0ED2C2CFF}" type="slidenum">
+              <a:rPr kumimoji="1" lang="ja-JP" altLang="en-US" smtClean="0"/>
+              <a:t>1</a:t>
+            </a:fld>
+            <a:endParaRPr kumimoji="1" lang="ja-JP" altLang="en-US"/>
+          </a:p>
+        </p:txBody>
+      </p:sp>
+    </p:spTree>
+    <p:extLst>
+      <p:ext uri="{BB962C8B-B14F-4D97-AF65-F5344CB8AC3E}">
+        <p14:creationId xmlns:p14="http://schemas.microsoft.com/office/powerpoint/2010/main" val="3547551098"/>
+      </p:ext>
+    </p:extLst>
+  </p:cSld>
+  <p:clrMapOvr>
+    <a:masterClrMapping/>
+  </p:clrMapOvr>
+</p:notes>
 </file>
 
 <file path=ppt/slideLayouts/slideLayout1.xml><?xml version="1.0" encoding="utf-8"?>
@@ -288,7 +768,7 @@
           <a:p>
             <a:fld id="{C309FD19-72D5-4F11-B672-89A6DBAD28AD}" type="datetimeFigureOut">
               <a:rPr kumimoji="1" lang="ja-JP" altLang="en-US" smtClean="0"/>
-              <a:t>2015/1/21</a:t>
+              <a:t>2015/2/2</a:t>
             </a:fld>
             <a:endParaRPr kumimoji="1" lang="ja-JP" altLang="en-US" dirty="0"/>
           </a:p>
@@ -490,7 +970,7 @@
           <a:p>
             <a:fld id="{C309FD19-72D5-4F11-B672-89A6DBAD28AD}" type="datetimeFigureOut">
               <a:rPr kumimoji="1" lang="ja-JP" altLang="en-US" smtClean="0"/>
-              <a:t>2015/1/21</a:t>
+              <a:t>2015/2/2</a:t>
             </a:fld>
             <a:endParaRPr kumimoji="1" lang="ja-JP" altLang="en-US" dirty="0"/>
           </a:p>
@@ -702,7 +1182,7 @@
           <a:p>
             <a:fld id="{C309FD19-72D5-4F11-B672-89A6DBAD28AD}" type="datetimeFigureOut">
               <a:rPr kumimoji="1" lang="ja-JP" altLang="en-US" smtClean="0"/>
-              <a:t>2015/1/21</a:t>
+              <a:t>2015/2/2</a:t>
             </a:fld>
             <a:endParaRPr kumimoji="1" lang="ja-JP" altLang="en-US" dirty="0"/>
           </a:p>
@@ -904,7 +1384,7 @@
           <a:p>
             <a:fld id="{C309FD19-72D5-4F11-B672-89A6DBAD28AD}" type="datetimeFigureOut">
               <a:rPr kumimoji="1" lang="ja-JP" altLang="en-US" smtClean="0"/>
-              <a:t>2015/1/21</a:t>
+              <a:t>2015/2/2</a:t>
             </a:fld>
             <a:endParaRPr kumimoji="1" lang="ja-JP" altLang="en-US" dirty="0"/>
           </a:p>
@@ -1150,7 +1630,7 @@
           <a:p>
             <a:fld id="{C309FD19-72D5-4F11-B672-89A6DBAD28AD}" type="datetimeFigureOut">
               <a:rPr kumimoji="1" lang="ja-JP" altLang="en-US" smtClean="0"/>
-              <a:t>2015/1/21</a:t>
+              <a:t>2015/2/2</a:t>
             </a:fld>
             <a:endParaRPr kumimoji="1" lang="ja-JP" altLang="en-US" dirty="0"/>
           </a:p>
@@ -1502,7 +1982,7 @@
           <a:p>
             <a:fld id="{C309FD19-72D5-4F11-B672-89A6DBAD28AD}" type="datetimeFigureOut">
               <a:rPr kumimoji="1" lang="ja-JP" altLang="en-US" smtClean="0"/>
-              <a:t>2015/1/21</a:t>
+              <a:t>2015/2/2</a:t>
             </a:fld>
             <a:endParaRPr kumimoji="1" lang="ja-JP" altLang="en-US" dirty="0"/>
           </a:p>
@@ -1988,7 +2468,7 @@
           <a:p>
             <a:fld id="{C309FD19-72D5-4F11-B672-89A6DBAD28AD}" type="datetimeFigureOut">
               <a:rPr kumimoji="1" lang="ja-JP" altLang="en-US" smtClean="0"/>
-              <a:t>2015/1/21</a:t>
+              <a:t>2015/2/2</a:t>
             </a:fld>
             <a:endParaRPr kumimoji="1" lang="ja-JP" altLang="en-US" dirty="0"/>
           </a:p>
@@ -2106,7 +2586,7 @@
           <a:p>
             <a:fld id="{C309FD19-72D5-4F11-B672-89A6DBAD28AD}" type="datetimeFigureOut">
               <a:rPr kumimoji="1" lang="ja-JP" altLang="en-US" smtClean="0"/>
-              <a:t>2015/1/21</a:t>
+              <a:t>2015/2/2</a:t>
             </a:fld>
             <a:endParaRPr kumimoji="1" lang="ja-JP" altLang="en-US" dirty="0"/>
           </a:p>
@@ -2201,7 +2681,7 @@
           <a:p>
             <a:fld id="{C309FD19-72D5-4F11-B672-89A6DBAD28AD}" type="datetimeFigureOut">
               <a:rPr kumimoji="1" lang="ja-JP" altLang="en-US" smtClean="0"/>
-              <a:t>2015/1/21</a:t>
+              <a:t>2015/2/2</a:t>
             </a:fld>
             <a:endParaRPr kumimoji="1" lang="ja-JP" altLang="en-US" dirty="0"/>
           </a:p>
@@ -2510,7 +2990,7 @@
           <a:p>
             <a:fld id="{C309FD19-72D5-4F11-B672-89A6DBAD28AD}" type="datetimeFigureOut">
               <a:rPr kumimoji="1" lang="ja-JP" altLang="en-US" smtClean="0"/>
-              <a:t>2015/1/21</a:t>
+              <a:t>2015/2/2</a:t>
             </a:fld>
             <a:endParaRPr kumimoji="1" lang="ja-JP" altLang="en-US" dirty="0"/>
           </a:p>
@@ -2763,7 +3243,7 @@
           <a:p>
             <a:fld id="{C309FD19-72D5-4F11-B672-89A6DBAD28AD}" type="datetimeFigureOut">
               <a:rPr kumimoji="1" lang="ja-JP" altLang="en-US" smtClean="0"/>
-              <a:t>2015/1/21</a:t>
+              <a:t>2015/2/2</a:t>
             </a:fld>
             <a:endParaRPr kumimoji="1" lang="ja-JP" altLang="en-US" dirty="0"/>
           </a:p>
@@ -3008,7 +3488,7 @@
           <a:p>
             <a:fld id="{C309FD19-72D5-4F11-B672-89A6DBAD28AD}" type="datetimeFigureOut">
               <a:rPr kumimoji="1" lang="ja-JP" altLang="en-US" smtClean="0"/>
-              <a:t>2015/1/21</a:t>
+              <a:t>2015/2/2</a:t>
             </a:fld>
             <a:endParaRPr kumimoji="1" lang="ja-JP" altLang="en-US" dirty="0"/>
           </a:p>
@@ -3385,28 +3865,28 @@
       </p:grpSpPr>
       <p:sp>
         <p:nvSpPr>
-          <p:cNvPr id="2" name="角丸四角形 1"/>
+          <p:cNvPr id="2" name="正方形/長方形 1"/>
           <p:cNvSpPr/>
           <p:nvPr/>
         </p:nvSpPr>
         <p:spPr>
           <a:xfrm>
-            <a:off x="1047684" y="548680"/>
-            <a:ext cx="2376264" cy="2592288"/>
-          </a:xfrm>
-          <a:prstGeom prst="roundRect">
+            <a:off x="5658942" y="5498179"/>
+            <a:ext cx="3377554" cy="1261036"/>
+          </a:xfrm>
+          <a:prstGeom prst="rect">
             <a:avLst/>
           </a:prstGeom>
         </p:spPr>
         <p:style>
-          <a:lnRef idx="1">
-            <a:schemeClr val="accent6"/>
+          <a:lnRef idx="2">
+            <a:schemeClr val="dk1"/>
           </a:lnRef>
-          <a:fillRef idx="2">
-            <a:schemeClr val="accent6"/>
+          <a:fillRef idx="1">
+            <a:schemeClr val="lt1"/>
           </a:fillRef>
-          <a:effectRef idx="1">
-            <a:schemeClr val="accent6"/>
+          <a:effectRef idx="0">
+            <a:schemeClr val="dk1"/>
           </a:effectRef>
           <a:fontRef idx="minor">
             <a:schemeClr val="dk1"/>
@@ -3416,93 +3896,35 @@
           <a:bodyPr rtlCol="0" anchor="ctr"/>
           <a:lstStyle/>
           <a:p>
-            <a:r>
-              <a:rPr lang="en-US" altLang="ja-JP" b="1" dirty="0" smtClean="0"/>
-              <a:t>xxx</a:t>
-            </a:r>
-            <a:r>
-              <a:rPr kumimoji="1" lang="en-US" altLang="ja-JP" b="1" dirty="0" smtClean="0"/>
-              <a:t>BLogic</a:t>
-            </a:r>
-          </a:p>
-          <a:p>
-            <a:r>
-              <a:rPr lang="ja-JP" altLang="en-US" b="1" dirty="0" smtClean="0"/>
-              <a:t>（ビジネスロジック）</a:t>
-            </a:r>
-            <a:endParaRPr lang="en-US" altLang="ja-JP" b="1" dirty="0" smtClean="0"/>
-          </a:p>
-          <a:p>
-            <a:endParaRPr kumimoji="1" lang="en-US" altLang="ja-JP" b="1" dirty="0"/>
-          </a:p>
-          <a:p>
-            <a:endParaRPr lang="en-US" altLang="ja-JP" b="1" dirty="0" smtClean="0"/>
-          </a:p>
-          <a:p>
-            <a:endParaRPr kumimoji="1" lang="en-US" altLang="ja-JP" b="1" dirty="0"/>
-          </a:p>
-          <a:p>
-            <a:endParaRPr lang="en-US" altLang="ja-JP" b="1" dirty="0" smtClean="0"/>
-          </a:p>
-          <a:p>
-            <a:endParaRPr kumimoji="1" lang="en-US" altLang="ja-JP" b="1" dirty="0"/>
-          </a:p>
-          <a:p>
-            <a:endParaRPr lang="en-US" altLang="ja-JP" b="1" dirty="0" smtClean="0"/>
-          </a:p>
-          <a:p>
-            <a:endParaRPr kumimoji="1" lang="ja-JP" altLang="en-US" b="1" dirty="0"/>
-          </a:p>
-        </p:txBody>
-      </p:sp>
-      <p:sp>
-        <p:nvSpPr>
-          <p:cNvPr id="3" name="正方形/長方形 2"/>
+            <a:pPr algn="ctr"/>
+            <a:endParaRPr kumimoji="1" lang="ja-JP" altLang="en-US" sz="1400"/>
+          </a:p>
+        </p:txBody>
+      </p:sp>
+      <p:sp>
+        <p:nvSpPr>
+          <p:cNvPr id="9" name="角丸四角形 8"/>
           <p:cNvSpPr/>
           <p:nvPr/>
         </p:nvSpPr>
         <p:spPr>
           <a:xfrm>
-            <a:off x="1240831" y="1710891"/>
-            <a:ext cx="1989969" cy="825858"/>
-          </a:xfrm>
-          <a:prstGeom prst="rect">
+            <a:off x="895923" y="527223"/>
+            <a:ext cx="1231951" cy="903570"/>
+          </a:xfrm>
+          <a:prstGeom prst="roundRect">
             <a:avLst/>
           </a:prstGeom>
-          <a:gradFill>
-            <a:gsLst>
-              <a:gs pos="0">
-                <a:schemeClr val="accent6">
-                  <a:shade val="51000"/>
-                  <a:satMod val="130000"/>
-                </a:schemeClr>
-              </a:gs>
-              <a:gs pos="54000">
-                <a:schemeClr val="accent6">
-                  <a:shade val="93000"/>
-                  <a:satMod val="130000"/>
-                  <a:lumMod val="10000"/>
-                  <a:lumOff val="90000"/>
-                </a:schemeClr>
-              </a:gs>
-              <a:gs pos="100000">
-                <a:schemeClr val="accent6">
-                  <a:shade val="94000"/>
-                  <a:satMod val="135000"/>
-                </a:schemeClr>
-              </a:gs>
-            </a:gsLst>
-          </a:gradFill>
         </p:spPr>
         <p:style>
           <a:lnRef idx="1">
-            <a:schemeClr val="accent6"/>
+            <a:schemeClr val="accent4"/>
           </a:lnRef>
           <a:fillRef idx="3">
-            <a:schemeClr val="accent6"/>
+            <a:schemeClr val="accent4"/>
           </a:fillRef>
           <a:effectRef idx="2">
-            <a:schemeClr val="accent6"/>
+            <a:schemeClr val="accent4"/>
           </a:effectRef>
           <a:fontRef idx="minor">
             <a:schemeClr val="lt1"/>
@@ -3514,336 +3936,45 @@
           <a:p>
             <a:pPr algn="ctr"/>
             <a:r>
-              <a:rPr kumimoji="1" lang="en-US" altLang="ja-JP" b="1" dirty="0" smtClean="0">
+              <a:rPr lang="en-US" altLang="ja-JP" sz="1600" b="1" dirty="0" smtClean="0">
                 <a:solidFill>
-                  <a:schemeClr val="tx1"/>
+                  <a:schemeClr val="bg1"/>
                 </a:solidFill>
               </a:rPr>
-              <a:t>DAO</a:t>
-            </a:r>
-            <a:r>
-              <a:rPr kumimoji="1" lang="ja-JP" altLang="en-US" b="1" dirty="0" smtClean="0">
-                <a:solidFill>
-                  <a:schemeClr val="tx1"/>
-                </a:solidFill>
-              </a:rPr>
-              <a:t>インタフェース</a:t>
-            </a:r>
-            <a:endParaRPr kumimoji="1" lang="ja-JP" altLang="en-US" b="1" dirty="0">
+              <a:t>BLogic</a:t>
+            </a:r>
+            <a:endParaRPr lang="en-US" altLang="ja-JP" sz="1600" b="1" dirty="0" smtClean="0">
               <a:solidFill>
-                <a:schemeClr val="tx1"/>
+                <a:schemeClr val="bg1"/>
               </a:solidFill>
             </a:endParaRPr>
           </a:p>
         </p:txBody>
       </p:sp>
-      <p:grpSp>
-        <p:nvGrpSpPr>
-          <p:cNvPr id="11" name="グループ化 10"/>
-          <p:cNvGrpSpPr/>
-          <p:nvPr/>
-        </p:nvGrpSpPr>
-        <p:grpSpPr>
-          <a:xfrm>
-            <a:off x="4608883" y="1714129"/>
-            <a:ext cx="2705124" cy="846320"/>
-            <a:chOff x="5303904" y="1761227"/>
-            <a:chExt cx="2186838" cy="846320"/>
-          </a:xfrm>
-        </p:grpSpPr>
-        <p:sp>
-          <p:nvSpPr>
-            <p:cNvPr id="6" name="正方形/長方形 5"/>
-            <p:cNvSpPr/>
-            <p:nvPr/>
-          </p:nvSpPr>
-          <p:spPr>
-            <a:xfrm>
-              <a:off x="5474518" y="1959475"/>
-              <a:ext cx="2016224" cy="648072"/>
-            </a:xfrm>
-            <a:prstGeom prst="rect">
-              <a:avLst/>
-            </a:prstGeom>
-            <a:gradFill>
-              <a:gsLst>
-                <a:gs pos="77500">
-                  <a:schemeClr val="accent2">
-                    <a:tint val="37000"/>
-                    <a:satMod val="300000"/>
-                  </a:schemeClr>
-                </a:gs>
-                <a:gs pos="0">
-                  <a:srgbClr val="FB41E5">
-                    <a:lumMod val="92000"/>
-                    <a:lumOff val="8000"/>
-                  </a:srgbClr>
-                </a:gs>
-                <a:gs pos="100000">
-                  <a:schemeClr val="accent2">
-                    <a:tint val="37000"/>
-                    <a:satMod val="300000"/>
-                  </a:schemeClr>
-                </a:gs>
-                <a:gs pos="46000">
-                  <a:schemeClr val="accent2">
-                    <a:tint val="15000"/>
-                    <a:satMod val="350000"/>
-                  </a:schemeClr>
-                </a:gs>
-              </a:gsLst>
-              <a:lin ang="16200000" scaled="1"/>
-            </a:gradFill>
-            <a:ln>
-              <a:solidFill>
-                <a:srgbClr val="FB41E5"/>
-              </a:solidFill>
-            </a:ln>
-          </p:spPr>
-          <p:style>
-            <a:lnRef idx="1">
-              <a:schemeClr val="accent2"/>
-            </a:lnRef>
-            <a:fillRef idx="2">
-              <a:schemeClr val="accent2"/>
-            </a:fillRef>
-            <a:effectRef idx="1">
-              <a:schemeClr val="accent2"/>
-            </a:effectRef>
-            <a:fontRef idx="minor">
-              <a:schemeClr val="dk1"/>
-            </a:fontRef>
-          </p:style>
-          <p:txBody>
-            <a:bodyPr rtlCol="0" anchor="ctr"/>
-            <a:lstStyle/>
-            <a:p>
-              <a:pPr algn="ctr"/>
-              <a:endParaRPr kumimoji="1" lang="ja-JP" altLang="en-US" dirty="0">
-                <a:solidFill>
-                  <a:schemeClr val="tx1"/>
-                </a:solidFill>
-              </a:endParaRPr>
-            </a:p>
-          </p:txBody>
-        </p:sp>
-        <p:sp>
-          <p:nvSpPr>
-            <p:cNvPr id="7" name="正方形/長方形 6"/>
-            <p:cNvSpPr/>
-            <p:nvPr/>
-          </p:nvSpPr>
-          <p:spPr>
-            <a:xfrm>
-              <a:off x="5379950" y="1761227"/>
-              <a:ext cx="2016224" cy="775522"/>
-            </a:xfrm>
-            <a:prstGeom prst="rect">
-              <a:avLst/>
-            </a:prstGeom>
-            <a:gradFill>
-              <a:gsLst>
-                <a:gs pos="77500">
-                  <a:schemeClr val="accent2">
-                    <a:tint val="37000"/>
-                    <a:satMod val="300000"/>
-                  </a:schemeClr>
-                </a:gs>
-                <a:gs pos="0">
-                  <a:srgbClr val="FB41E5">
-                    <a:lumMod val="92000"/>
-                    <a:lumOff val="8000"/>
-                  </a:srgbClr>
-                </a:gs>
-                <a:gs pos="100000">
-                  <a:schemeClr val="accent2">
-                    <a:tint val="37000"/>
-                    <a:satMod val="300000"/>
-                  </a:schemeClr>
-                </a:gs>
-                <a:gs pos="46000">
-                  <a:schemeClr val="accent2">
-                    <a:tint val="15000"/>
-                    <a:satMod val="350000"/>
-                  </a:schemeClr>
-                </a:gs>
-              </a:gsLst>
-              <a:lin ang="16200000" scaled="1"/>
-            </a:gradFill>
-            <a:ln>
-              <a:solidFill>
-                <a:srgbClr val="FB41E5"/>
-              </a:solidFill>
-            </a:ln>
-          </p:spPr>
-          <p:style>
-            <a:lnRef idx="1">
-              <a:schemeClr val="accent2"/>
-            </a:lnRef>
-            <a:fillRef idx="2">
-              <a:schemeClr val="accent2"/>
-            </a:fillRef>
-            <a:effectRef idx="1">
-              <a:schemeClr val="accent2"/>
-            </a:effectRef>
-            <a:fontRef idx="minor">
-              <a:schemeClr val="dk1"/>
-            </a:fontRef>
-          </p:style>
-          <p:txBody>
-            <a:bodyPr rtlCol="0" anchor="ctr"/>
-            <a:lstStyle/>
-            <a:p>
-              <a:pPr algn="ctr"/>
-              <a:endParaRPr kumimoji="1" lang="ja-JP" altLang="en-US" dirty="0">
-                <a:solidFill>
-                  <a:schemeClr val="tx1"/>
-                </a:solidFill>
-              </a:endParaRPr>
-            </a:p>
-          </p:txBody>
-        </p:sp>
-        <p:sp>
-          <p:nvSpPr>
-            <p:cNvPr id="4" name="正方形/長方形 3"/>
-            <p:cNvSpPr/>
-            <p:nvPr/>
-          </p:nvSpPr>
-          <p:spPr>
-            <a:xfrm>
-              <a:off x="5303904" y="1761227"/>
-              <a:ext cx="2016224" cy="648072"/>
-            </a:xfrm>
-            <a:prstGeom prst="rect">
-              <a:avLst/>
-            </a:prstGeom>
-            <a:gradFill>
-              <a:gsLst>
-                <a:gs pos="77500">
-                  <a:schemeClr val="accent2">
-                    <a:tint val="37000"/>
-                    <a:satMod val="300000"/>
-                  </a:schemeClr>
-                </a:gs>
-                <a:gs pos="0">
-                  <a:srgbClr val="FB41E5">
-                    <a:lumMod val="92000"/>
-                    <a:lumOff val="8000"/>
-                  </a:srgbClr>
-                </a:gs>
-                <a:gs pos="100000">
-                  <a:schemeClr val="accent2">
-                    <a:tint val="37000"/>
-                    <a:satMod val="300000"/>
-                  </a:schemeClr>
-                </a:gs>
-                <a:gs pos="46000">
-                  <a:schemeClr val="accent2">
-                    <a:tint val="15000"/>
-                    <a:satMod val="350000"/>
-                  </a:schemeClr>
-                </a:gs>
-              </a:gsLst>
-              <a:lin ang="16200000" scaled="1"/>
-            </a:gradFill>
-            <a:ln>
-              <a:solidFill>
-                <a:srgbClr val="FB41E5"/>
-              </a:solidFill>
-            </a:ln>
-          </p:spPr>
-          <p:style>
-            <a:lnRef idx="1">
-              <a:schemeClr val="accent2"/>
-            </a:lnRef>
-            <a:fillRef idx="2">
-              <a:schemeClr val="accent2"/>
-            </a:fillRef>
-            <a:effectRef idx="1">
-              <a:schemeClr val="accent2"/>
-            </a:effectRef>
-            <a:fontRef idx="minor">
-              <a:schemeClr val="dk1"/>
-            </a:fontRef>
-          </p:style>
-          <p:txBody>
-            <a:bodyPr rtlCol="0" anchor="ctr"/>
-            <a:lstStyle/>
-            <a:p>
-              <a:pPr algn="ctr"/>
-              <a:r>
-                <a:rPr kumimoji="1" lang="en-US" altLang="ja-JP" b="1" dirty="0" smtClean="0">
-                  <a:solidFill>
-                    <a:schemeClr val="tx1"/>
-                  </a:solidFill>
-                </a:rPr>
-                <a:t>DAO</a:t>
-              </a:r>
-              <a:r>
-                <a:rPr kumimoji="1" lang="ja-JP" altLang="en-US" b="1" dirty="0" smtClean="0">
-                  <a:solidFill>
-                    <a:schemeClr val="tx1"/>
-                  </a:solidFill>
-                </a:rPr>
-                <a:t>実装クラス</a:t>
-              </a:r>
-              <a:endParaRPr kumimoji="1" lang="en-US" altLang="ja-JP" b="1" dirty="0" smtClean="0">
-                <a:solidFill>
-                  <a:schemeClr val="tx1"/>
-                </a:solidFill>
-              </a:endParaRPr>
-            </a:p>
-            <a:p>
-              <a:pPr algn="ctr"/>
-              <a:r>
-                <a:rPr lang="en-US" altLang="ja-JP" b="1" dirty="0" smtClean="0">
-                  <a:solidFill>
-                    <a:schemeClr val="tx1"/>
-                  </a:solidFill>
-                </a:rPr>
-                <a:t>(MyBatis3)</a:t>
-              </a:r>
-              <a:endParaRPr kumimoji="1" lang="ja-JP" altLang="en-US" b="1" dirty="0">
-                <a:solidFill>
-                  <a:schemeClr val="tx1"/>
-                </a:solidFill>
-              </a:endParaRPr>
-            </a:p>
-          </p:txBody>
-        </p:sp>
-      </p:grpSp>
-      <p:sp>
-        <p:nvSpPr>
-          <p:cNvPr id="8" name="右矢印 7"/>
+      <p:sp>
+        <p:nvSpPr>
+          <p:cNvPr id="10" name="角丸四角形 9"/>
           <p:cNvSpPr/>
           <p:nvPr/>
         </p:nvSpPr>
         <p:spPr>
-          <a:xfrm flipH="1">
-            <a:off x="3248253" y="1866302"/>
-            <a:ext cx="1291551" cy="428346"/>
-          </a:xfrm>
-          <a:prstGeom prst="rightArrow">
+          <a:xfrm>
+            <a:off x="2692901" y="502084"/>
+            <a:ext cx="1044525" cy="903570"/>
+          </a:xfrm>
+          <a:prstGeom prst="roundRect">
             <a:avLst/>
           </a:prstGeom>
-          <a:solidFill>
-            <a:srgbClr val="FB41E5"/>
-          </a:solidFill>
-          <a:ln>
-            <a:solidFill>
-              <a:srgbClr val="FB41E5"/>
-            </a:solidFill>
-          </a:ln>
         </p:spPr>
         <p:style>
           <a:lnRef idx="1">
-            <a:schemeClr val="accent2"/>
+            <a:schemeClr val="accent4"/>
           </a:lnRef>
           <a:fillRef idx="3">
-            <a:schemeClr val="accent2"/>
+            <a:schemeClr val="accent4"/>
           </a:fillRef>
           <a:effectRef idx="2">
-            <a:schemeClr val="accent2"/>
+            <a:schemeClr val="accent4"/>
           </a:effectRef>
           <a:fontRef idx="minor">
             <a:schemeClr val="lt1"/>
@@ -3854,22 +3985,83 @@
           <a:lstStyle/>
           <a:p>
             <a:pPr algn="ctr"/>
-            <a:endParaRPr kumimoji="1" lang="ja-JP" altLang="en-US" dirty="0"/>
-          </a:p>
-        </p:txBody>
-      </p:sp>
-      <p:sp>
-        <p:nvSpPr>
-          <p:cNvPr id="10" name="フローチャート : 磁気ディスク 9"/>
+            <a:r>
+              <a:rPr lang="en-US" altLang="ja-JP" sz="1600" b="1" dirty="0" smtClean="0"/>
+              <a:t>DAO</a:t>
+            </a:r>
+            <a:endParaRPr lang="en-US" altLang="ja-JP" sz="1600" b="1" dirty="0" smtClean="0"/>
+          </a:p>
+        </p:txBody>
+      </p:sp>
+      <p:sp>
+        <p:nvSpPr>
+          <p:cNvPr id="44" name="フローチャート : 書類 43"/>
           <p:cNvSpPr/>
           <p:nvPr/>
         </p:nvSpPr>
         <p:spPr>
           <a:xfrm>
-            <a:off x="1311993" y="3778493"/>
-            <a:ext cx="1847644" cy="972108"/>
-          </a:xfrm>
-          <a:prstGeom prst="flowChartMagneticDisk">
+            <a:off x="6442294" y="525549"/>
+            <a:ext cx="874812" cy="903570"/>
+          </a:xfrm>
+          <a:prstGeom prst="flowChartDocument">
+            <a:avLst/>
+          </a:prstGeom>
+          <a:ln/>
+        </p:spPr>
+        <p:style>
+          <a:lnRef idx="1">
+            <a:schemeClr val="accent4"/>
+          </a:lnRef>
+          <a:fillRef idx="3">
+            <a:schemeClr val="accent4"/>
+          </a:fillRef>
+          <a:effectRef idx="2">
+            <a:schemeClr val="accent4"/>
+          </a:effectRef>
+          <a:fontRef idx="minor">
+            <a:schemeClr val="lt1"/>
+          </a:fontRef>
+        </p:style>
+        <p:txBody>
+          <a:bodyPr rtlCol="0" anchor="ctr"/>
+          <a:lstStyle/>
+          <a:p>
+            <a:pPr algn="ctr"/>
+            <a:r>
+              <a:rPr lang="en-US" altLang="ja-JP" sz="1400" b="1" dirty="0" smtClean="0"/>
+              <a:t>SQL</a:t>
+            </a:r>
+          </a:p>
+          <a:p>
+            <a:pPr algn="ctr"/>
+            <a:r>
+              <a:rPr lang="en-US" altLang="ja-JP" sz="1400" b="1" dirty="0" smtClean="0"/>
+              <a:t>MAPPER</a:t>
+            </a:r>
+          </a:p>
+          <a:p>
+            <a:pPr algn="ctr"/>
+            <a:r>
+              <a:rPr lang="ja-JP" altLang="en-US" sz="1400" b="1" dirty="0" smtClean="0"/>
+              <a:t>ファイル</a:t>
+            </a:r>
+            <a:endParaRPr lang="en-US" altLang="ja-JP" sz="1400" b="1" dirty="0"/>
+          </a:p>
+        </p:txBody>
+      </p:sp>
+      <p:sp>
+        <p:nvSpPr>
+          <p:cNvPr id="50" name="角丸四角形 49"/>
+          <p:cNvSpPr/>
+          <p:nvPr/>
+        </p:nvSpPr>
+        <p:spPr>
+          <a:xfrm>
+            <a:off x="5080425" y="525549"/>
+            <a:ext cx="1157034" cy="903570"/>
+          </a:xfrm>
+          <a:prstGeom prst="roundRect">
             <a:avLst/>
           </a:prstGeom>
         </p:spPr>
@@ -3893,31 +4085,219 @@
           <a:p>
             <a:pPr algn="ctr"/>
             <a:r>
-              <a:rPr kumimoji="1" lang="ja-JP" altLang="en-US" b="1" dirty="0" smtClean="0">
-                <a:solidFill>
-                  <a:schemeClr val="tx1"/>
-                </a:solidFill>
-              </a:rPr>
-              <a:t>データベース</a:t>
-            </a:r>
-            <a:endParaRPr kumimoji="1" lang="ja-JP" altLang="en-US" b="1" dirty="0">
-              <a:solidFill>
-                <a:schemeClr val="tx1"/>
-              </a:solidFill>
-            </a:endParaRPr>
-          </a:p>
-        </p:txBody>
-      </p:sp>
-      <p:sp>
-        <p:nvSpPr>
-          <p:cNvPr id="12" name="右矢印 11"/>
+              <a:rPr lang="en-US" altLang="ja-JP" sz="1600" b="1" dirty="0" smtClean="0"/>
+              <a:t>MyBatis3</a:t>
+            </a:r>
+            <a:endParaRPr lang="en-US" altLang="ja-JP" sz="1600" b="1" dirty="0" smtClean="0"/>
+          </a:p>
+        </p:txBody>
+      </p:sp>
+      <p:cxnSp>
+        <p:nvCxnSpPr>
+          <p:cNvPr id="54" name="直線コネクタ 53"/>
+          <p:cNvCxnSpPr/>
+          <p:nvPr/>
+        </p:nvCxnSpPr>
+        <p:spPr>
+          <a:xfrm flipH="1">
+            <a:off x="5658942" y="1438644"/>
+            <a:ext cx="1" cy="3934572"/>
+          </a:xfrm>
+          <a:prstGeom prst="line">
+            <a:avLst/>
+          </a:prstGeom>
+          <a:ln>
+            <a:solidFill>
+              <a:schemeClr val="tx1">
+                <a:lumMod val="50000"/>
+                <a:lumOff val="50000"/>
+              </a:schemeClr>
+            </a:solidFill>
+          </a:ln>
+        </p:spPr>
+        <p:style>
+          <a:lnRef idx="2">
+            <a:schemeClr val="accent1"/>
+          </a:lnRef>
+          <a:fillRef idx="0">
+            <a:schemeClr val="accent1"/>
+          </a:fillRef>
+          <a:effectRef idx="1">
+            <a:schemeClr val="accent1"/>
+          </a:effectRef>
+          <a:fontRef idx="minor">
+            <a:schemeClr val="tx1"/>
+          </a:fontRef>
+        </p:style>
+      </p:cxnSp>
+      <p:cxnSp>
+        <p:nvCxnSpPr>
+          <p:cNvPr id="55" name="直線コネクタ 54"/>
+          <p:cNvCxnSpPr/>
+          <p:nvPr/>
+        </p:nvCxnSpPr>
+        <p:spPr>
+          <a:xfrm flipH="1">
+            <a:off x="6908204" y="1419594"/>
+            <a:ext cx="1" cy="3819156"/>
+          </a:xfrm>
+          <a:prstGeom prst="line">
+            <a:avLst/>
+          </a:prstGeom>
+          <a:ln>
+            <a:solidFill>
+              <a:schemeClr val="tx1">
+                <a:lumMod val="50000"/>
+                <a:lumOff val="50000"/>
+              </a:schemeClr>
+            </a:solidFill>
+          </a:ln>
+        </p:spPr>
+        <p:style>
+          <a:lnRef idx="2">
+            <a:schemeClr val="accent1"/>
+          </a:lnRef>
+          <a:fillRef idx="0">
+            <a:schemeClr val="accent1"/>
+          </a:fillRef>
+          <a:effectRef idx="1">
+            <a:schemeClr val="accent1"/>
+          </a:effectRef>
+          <a:fontRef idx="minor">
+            <a:schemeClr val="tx1"/>
+          </a:fontRef>
+        </p:style>
+      </p:cxnSp>
+      <p:cxnSp>
+        <p:nvCxnSpPr>
+          <p:cNvPr id="78" name="直線コネクタ 77"/>
+          <p:cNvCxnSpPr/>
+          <p:nvPr/>
+        </p:nvCxnSpPr>
+        <p:spPr>
+          <a:xfrm flipH="1">
+            <a:off x="1563983" y="1430793"/>
+            <a:ext cx="1" cy="4084182"/>
+          </a:xfrm>
+          <a:prstGeom prst="line">
+            <a:avLst/>
+          </a:prstGeom>
+          <a:ln>
+            <a:solidFill>
+              <a:schemeClr val="tx1">
+                <a:lumMod val="50000"/>
+                <a:lumOff val="50000"/>
+              </a:schemeClr>
+            </a:solidFill>
+          </a:ln>
+        </p:spPr>
+        <p:style>
+          <a:lnRef idx="2">
+            <a:schemeClr val="accent1"/>
+          </a:lnRef>
+          <a:fillRef idx="0">
+            <a:schemeClr val="accent1"/>
+          </a:fillRef>
+          <a:effectRef idx="1">
+            <a:schemeClr val="accent1"/>
+          </a:effectRef>
+          <a:fontRef idx="minor">
+            <a:schemeClr val="tx1"/>
+          </a:fontRef>
+        </p:style>
+      </p:cxnSp>
+      <p:cxnSp>
+        <p:nvCxnSpPr>
+          <p:cNvPr id="83" name="直線コネクタ 82"/>
+          <p:cNvCxnSpPr/>
+          <p:nvPr/>
+        </p:nvCxnSpPr>
+        <p:spPr>
+          <a:xfrm flipH="1">
+            <a:off x="3215163" y="1421268"/>
+            <a:ext cx="1" cy="4084182"/>
+          </a:xfrm>
+          <a:prstGeom prst="line">
+            <a:avLst/>
+          </a:prstGeom>
+          <a:ln>
+            <a:solidFill>
+              <a:schemeClr val="tx1">
+                <a:lumMod val="50000"/>
+                <a:lumOff val="50000"/>
+              </a:schemeClr>
+            </a:solidFill>
+          </a:ln>
+        </p:spPr>
+        <p:style>
+          <a:lnRef idx="2">
+            <a:schemeClr val="accent1"/>
+          </a:lnRef>
+          <a:fillRef idx="0">
+            <a:schemeClr val="accent1"/>
+          </a:fillRef>
+          <a:effectRef idx="1">
+            <a:schemeClr val="accent1"/>
+          </a:effectRef>
+          <a:fontRef idx="minor">
+            <a:schemeClr val="tx1"/>
+          </a:fontRef>
+        </p:style>
+      </p:cxnSp>
+      <p:sp>
+        <p:nvSpPr>
+          <p:cNvPr id="27" name="角丸四角形 26"/>
           <p:cNvSpPr/>
           <p:nvPr/>
         </p:nvSpPr>
         <p:spPr>
-          <a:xfrm rot="16200000" flipH="1">
-            <a:off x="1697656" y="2994672"/>
-            <a:ext cx="1076321" cy="428346"/>
+          <a:xfrm>
+            <a:off x="3124009" y="1753336"/>
+            <a:ext cx="165600" cy="3531122"/>
+          </a:xfrm>
+          <a:prstGeom prst="roundRect">
+            <a:avLst/>
+          </a:prstGeom>
+          <a:ln/>
+        </p:spPr>
+        <p:style>
+          <a:lnRef idx="1">
+            <a:schemeClr val="dk1"/>
+          </a:lnRef>
+          <a:fillRef idx="2">
+            <a:schemeClr val="dk1"/>
+          </a:fillRef>
+          <a:effectRef idx="1">
+            <a:schemeClr val="dk1"/>
+          </a:effectRef>
+          <a:fontRef idx="minor">
+            <a:schemeClr val="dk1"/>
+          </a:fontRef>
+        </p:style>
+        <p:txBody>
+          <a:bodyPr rot="0" spcFirstLastPara="0" vertOverflow="overflow" horzOverflow="overflow" vert="horz" wrap="square" lIns="91440" tIns="45720" rIns="91440" bIns="45720" numCol="1" spcCol="0" rtlCol="0" fromWordArt="0" anchor="ctr" anchorCtr="0" forceAA="0" compatLnSpc="1">
+            <a:prstTxWarp prst="textNoShape">
+              <a:avLst/>
+            </a:prstTxWarp>
+            <a:noAutofit/>
+          </a:bodyPr>
+          <a:lstStyle/>
+          <a:p>
+            <a:pPr algn="ctr"/>
+            <a:endParaRPr kumimoji="1" lang="ja-JP" altLang="en-US"/>
+          </a:p>
+        </p:txBody>
+      </p:sp>
+      <p:sp>
+        <p:nvSpPr>
+          <p:cNvPr id="84" name="右矢印 83"/>
+          <p:cNvSpPr/>
+          <p:nvPr/>
+        </p:nvSpPr>
+        <p:spPr>
+          <a:xfrm>
+            <a:off x="1642847" y="1947852"/>
+            <a:ext cx="1458610" cy="295275"/>
           </a:xfrm>
           <a:prstGeom prst="rightArrow">
             <a:avLst/>
@@ -3926,559 +4306,528 @@
         </p:spPr>
         <p:style>
           <a:lnRef idx="1">
-            <a:schemeClr val="accent6"/>
+            <a:schemeClr val="dk1"/>
+          </a:lnRef>
+          <a:fillRef idx="2">
+            <a:schemeClr val="dk1"/>
+          </a:fillRef>
+          <a:effectRef idx="1">
+            <a:schemeClr val="dk1"/>
+          </a:effectRef>
+          <a:fontRef idx="minor">
+            <a:schemeClr val="dk1"/>
+          </a:fontRef>
+        </p:style>
+        <p:txBody>
+          <a:bodyPr rot="0" spcFirstLastPara="0" vertOverflow="overflow" horzOverflow="overflow" vert="horz" wrap="square" lIns="91440" tIns="45720" rIns="91440" bIns="45720" numCol="1" spcCol="0" rtlCol="0" fromWordArt="0" anchor="ctr" anchorCtr="0" forceAA="0" compatLnSpc="1">
+            <a:prstTxWarp prst="textNoShape">
+              <a:avLst/>
+            </a:prstTxWarp>
+            <a:noAutofit/>
+          </a:bodyPr>
+          <a:lstStyle/>
+          <a:p>
+            <a:pPr algn="ctr"/>
+            <a:endParaRPr kumimoji="1" lang="ja-JP" altLang="en-US"/>
+          </a:p>
+        </p:txBody>
+      </p:sp>
+      <p:sp>
+        <p:nvSpPr>
+          <p:cNvPr id="90" name="角丸四角形 89"/>
+          <p:cNvSpPr/>
+          <p:nvPr/>
+        </p:nvSpPr>
+        <p:spPr>
+          <a:xfrm>
+            <a:off x="5576142" y="2094130"/>
+            <a:ext cx="165600" cy="3144620"/>
+          </a:xfrm>
+          <a:prstGeom prst="roundRect">
+            <a:avLst/>
+          </a:prstGeom>
+          <a:ln/>
+        </p:spPr>
+        <p:style>
+          <a:lnRef idx="1">
+            <a:schemeClr val="dk1"/>
+          </a:lnRef>
+          <a:fillRef idx="2">
+            <a:schemeClr val="dk1"/>
+          </a:fillRef>
+          <a:effectRef idx="1">
+            <a:schemeClr val="dk1"/>
+          </a:effectRef>
+          <a:fontRef idx="minor">
+            <a:schemeClr val="dk1"/>
+          </a:fontRef>
+        </p:style>
+        <p:txBody>
+          <a:bodyPr rot="0" spcFirstLastPara="0" vertOverflow="overflow" horzOverflow="overflow" vert="horz" wrap="square" lIns="91440" tIns="45720" rIns="91440" bIns="45720" numCol="1" spcCol="0" rtlCol="0" fromWordArt="0" anchor="ctr" anchorCtr="0" forceAA="0" compatLnSpc="1">
+            <a:prstTxWarp prst="textNoShape">
+              <a:avLst/>
+            </a:prstTxWarp>
+            <a:noAutofit/>
+          </a:bodyPr>
+          <a:lstStyle/>
+          <a:p>
+            <a:pPr algn="ctr"/>
+            <a:endParaRPr kumimoji="1" lang="ja-JP" altLang="en-US"/>
+          </a:p>
+        </p:txBody>
+      </p:sp>
+      <p:sp>
+        <p:nvSpPr>
+          <p:cNvPr id="92" name="角丸四角形 91"/>
+          <p:cNvSpPr/>
+          <p:nvPr/>
+        </p:nvSpPr>
+        <p:spPr>
+          <a:xfrm>
+            <a:off x="6826632" y="2612460"/>
+            <a:ext cx="165600" cy="898272"/>
+          </a:xfrm>
+          <a:prstGeom prst="roundRect">
+            <a:avLst/>
+          </a:prstGeom>
+          <a:ln/>
+        </p:spPr>
+        <p:style>
+          <a:lnRef idx="1">
+            <a:schemeClr val="dk1"/>
+          </a:lnRef>
+          <a:fillRef idx="2">
+            <a:schemeClr val="dk1"/>
+          </a:fillRef>
+          <a:effectRef idx="1">
+            <a:schemeClr val="dk1"/>
+          </a:effectRef>
+          <a:fontRef idx="minor">
+            <a:schemeClr val="dk1"/>
+          </a:fontRef>
+        </p:style>
+        <p:txBody>
+          <a:bodyPr rot="0" spcFirstLastPara="0" vertOverflow="overflow" horzOverflow="overflow" vert="horz" wrap="square" lIns="91440" tIns="45720" rIns="91440" bIns="45720" numCol="1" spcCol="0" rtlCol="0" fromWordArt="0" anchor="ctr" anchorCtr="0" forceAA="0" compatLnSpc="1">
+            <a:prstTxWarp prst="textNoShape">
+              <a:avLst/>
+            </a:prstTxWarp>
+            <a:noAutofit/>
+          </a:bodyPr>
+          <a:lstStyle/>
+          <a:p>
+            <a:pPr algn="ctr"/>
+            <a:endParaRPr kumimoji="1" lang="ja-JP" altLang="en-US"/>
+          </a:p>
+        </p:txBody>
+      </p:sp>
+      <p:sp>
+        <p:nvSpPr>
+          <p:cNvPr id="93" name="右矢印 92"/>
+          <p:cNvSpPr/>
+          <p:nvPr/>
+        </p:nvSpPr>
+        <p:spPr>
+          <a:xfrm>
+            <a:off x="5770558" y="2621418"/>
+            <a:ext cx="1056074" cy="295275"/>
+          </a:xfrm>
+          <a:prstGeom prst="rightArrow">
+            <a:avLst/>
+          </a:prstGeom>
+          <a:ln/>
+        </p:spPr>
+        <p:style>
+          <a:lnRef idx="1">
+            <a:schemeClr val="dk1"/>
+          </a:lnRef>
+          <a:fillRef idx="2">
+            <a:schemeClr val="dk1"/>
+          </a:fillRef>
+          <a:effectRef idx="1">
+            <a:schemeClr val="dk1"/>
+          </a:effectRef>
+          <a:fontRef idx="minor">
+            <a:schemeClr val="dk1"/>
+          </a:fontRef>
+        </p:style>
+        <p:txBody>
+          <a:bodyPr rot="0" spcFirstLastPara="0" vertOverflow="overflow" horzOverflow="overflow" vert="horz" wrap="square" lIns="91440" tIns="45720" rIns="91440" bIns="45720" numCol="1" spcCol="0" rtlCol="0" fromWordArt="0" anchor="ctr" anchorCtr="0" forceAA="0" compatLnSpc="1">
+            <a:prstTxWarp prst="textNoShape">
+              <a:avLst/>
+            </a:prstTxWarp>
+            <a:noAutofit/>
+          </a:bodyPr>
+          <a:lstStyle/>
+          <a:p>
+            <a:pPr algn="ctr"/>
+            <a:endParaRPr kumimoji="1" lang="ja-JP" altLang="en-US"/>
+          </a:p>
+        </p:txBody>
+      </p:sp>
+      <p:sp>
+        <p:nvSpPr>
+          <p:cNvPr id="94" name="右矢印 93"/>
+          <p:cNvSpPr/>
+          <p:nvPr/>
+        </p:nvSpPr>
+        <p:spPr>
+          <a:xfrm rot="10800000">
+            <a:off x="4569263" y="4300245"/>
+            <a:ext cx="972022" cy="295278"/>
+          </a:xfrm>
+          <a:prstGeom prst="rightArrow">
+            <a:avLst/>
+          </a:prstGeom>
+          <a:ln/>
+        </p:spPr>
+        <p:style>
+          <a:lnRef idx="1">
+            <a:schemeClr val="dk1"/>
+          </a:lnRef>
+          <a:fillRef idx="2">
+            <a:schemeClr val="dk1"/>
+          </a:fillRef>
+          <a:effectRef idx="1">
+            <a:schemeClr val="dk1"/>
+          </a:effectRef>
+          <a:fontRef idx="minor">
+            <a:schemeClr val="dk1"/>
+          </a:fontRef>
+        </p:style>
+        <p:txBody>
+          <a:bodyPr rot="0" spcFirstLastPara="0" vertOverflow="overflow" horzOverflow="overflow" vert="horz" wrap="square" lIns="91440" tIns="45720" rIns="91440" bIns="45720" numCol="1" spcCol="0" rtlCol="0" fromWordArt="0" anchor="ctr" anchorCtr="0" forceAA="0" compatLnSpc="1">
+            <a:prstTxWarp prst="textNoShape">
+              <a:avLst/>
+            </a:prstTxWarp>
+            <a:noAutofit/>
+          </a:bodyPr>
+          <a:lstStyle/>
+          <a:p>
+            <a:pPr algn="ctr"/>
+            <a:endParaRPr kumimoji="1" lang="ja-JP" altLang="en-US"/>
+          </a:p>
+        </p:txBody>
+      </p:sp>
+      <p:sp>
+        <p:nvSpPr>
+          <p:cNvPr id="95" name="角丸四角形 94"/>
+          <p:cNvSpPr/>
+          <p:nvPr/>
+        </p:nvSpPr>
+        <p:spPr>
+          <a:xfrm>
+            <a:off x="1477756" y="1782712"/>
+            <a:ext cx="165091" cy="3456038"/>
+          </a:xfrm>
+          <a:prstGeom prst="roundRect">
+            <a:avLst/>
+          </a:prstGeom>
+          <a:ln/>
+        </p:spPr>
+        <p:style>
+          <a:lnRef idx="1">
+            <a:schemeClr val="dk1"/>
+          </a:lnRef>
+          <a:fillRef idx="2">
+            <a:schemeClr val="dk1"/>
+          </a:fillRef>
+          <a:effectRef idx="1">
+            <a:schemeClr val="dk1"/>
+          </a:effectRef>
+          <a:fontRef idx="minor">
+            <a:schemeClr val="dk1"/>
+          </a:fontRef>
+        </p:style>
+        <p:txBody>
+          <a:bodyPr rot="0" spcFirstLastPara="0" vertOverflow="overflow" horzOverflow="overflow" vert="horz" wrap="square" lIns="91440" tIns="45720" rIns="91440" bIns="45720" numCol="1" spcCol="0" rtlCol="0" fromWordArt="0" anchor="ctr" anchorCtr="0" forceAA="0" compatLnSpc="1">
+            <a:prstTxWarp prst="textNoShape">
+              <a:avLst/>
+            </a:prstTxWarp>
+            <a:noAutofit/>
+          </a:bodyPr>
+          <a:lstStyle/>
+          <a:p>
+            <a:pPr algn="ctr"/>
+            <a:endParaRPr kumimoji="1" lang="ja-JP" altLang="en-US"/>
+          </a:p>
+        </p:txBody>
+      </p:sp>
+      <p:sp>
+        <p:nvSpPr>
+          <p:cNvPr id="96" name="正方形/長方形 95"/>
+          <p:cNvSpPr/>
+          <p:nvPr/>
+        </p:nvSpPr>
+        <p:spPr>
+          <a:xfrm>
+            <a:off x="5760751" y="2298328"/>
+            <a:ext cx="1569660" cy="338554"/>
+          </a:xfrm>
+          <a:prstGeom prst="rect">
+            <a:avLst/>
+          </a:prstGeom>
+        </p:spPr>
+        <p:txBody>
+          <a:bodyPr wrap="none">
+            <a:spAutoFit/>
+          </a:bodyPr>
+          <a:lstStyle/>
+          <a:p>
+            <a:pPr algn="ctr"/>
+            <a:r>
+              <a:rPr lang="en-US" altLang="ja-JP" sz="1600" b="1" dirty="0" smtClean="0"/>
+              <a:t>(</a:t>
+            </a:r>
+            <a:r>
+              <a:rPr lang="en-US" altLang="ja-JP" sz="1600" b="1" dirty="0"/>
+              <a:t>3</a:t>
+            </a:r>
+            <a:r>
+              <a:rPr lang="en-US" altLang="ja-JP" sz="1600" b="1" dirty="0" smtClean="0"/>
+              <a:t>)SQL</a:t>
+            </a:r>
+            <a:r>
+              <a:rPr lang="ja-JP" altLang="en-US" sz="1600" b="1" dirty="0" smtClean="0"/>
+              <a:t>文の検索</a:t>
+            </a:r>
+            <a:endParaRPr lang="ja-JP" altLang="en-US" sz="1600" b="1" dirty="0"/>
+          </a:p>
+        </p:txBody>
+      </p:sp>
+      <p:sp>
+        <p:nvSpPr>
+          <p:cNvPr id="33" name="フローチャート : 磁気ディスク 32"/>
+          <p:cNvSpPr/>
+          <p:nvPr/>
+        </p:nvSpPr>
+        <p:spPr>
+          <a:xfrm>
+            <a:off x="7523031" y="504128"/>
+            <a:ext cx="939854" cy="922619"/>
+          </a:xfrm>
+          <a:prstGeom prst="flowChartMagneticDisk">
+            <a:avLst/>
+          </a:prstGeom>
+          <a:ln/>
+        </p:spPr>
+        <p:style>
+          <a:lnRef idx="1">
+            <a:schemeClr val="dk1"/>
           </a:lnRef>
           <a:fillRef idx="3">
-            <a:schemeClr val="accent6"/>
+            <a:schemeClr val="dk1"/>
           </a:fillRef>
           <a:effectRef idx="2">
-            <a:schemeClr val="accent6"/>
+            <a:schemeClr val="dk1"/>
           </a:effectRef>
           <a:fontRef idx="minor">
             <a:schemeClr val="lt1"/>
           </a:fontRef>
         </p:style>
         <p:txBody>
-          <a:bodyPr rtlCol="0" anchor="ctr"/>
+          <a:bodyPr rot="0" spcFirstLastPara="0" vertOverflow="overflow" horzOverflow="overflow" vert="horz" wrap="square" lIns="91440" tIns="45720" rIns="91440" bIns="45720" numCol="1" spcCol="0" rtlCol="0" fromWordArt="0" anchor="ctr" anchorCtr="0" forceAA="0" compatLnSpc="1">
+            <a:prstTxWarp prst="textNoShape">
+              <a:avLst/>
+            </a:prstTxWarp>
+            <a:noAutofit/>
+          </a:bodyPr>
           <a:lstStyle/>
           <a:p>
             <a:pPr algn="ctr"/>
-            <a:endParaRPr kumimoji="1" lang="ja-JP" altLang="en-US" dirty="0"/>
-          </a:p>
-        </p:txBody>
-      </p:sp>
-      <p:grpSp>
-        <p:nvGrpSpPr>
-          <p:cNvPr id="15" name="グループ化 14"/>
-          <p:cNvGrpSpPr/>
+            <a:r>
+              <a:rPr kumimoji="1" lang="ja-JP" altLang="en-US" sz="1600" b="1" dirty="0" smtClean="0">
+                <a:latin typeface="+mj-lt"/>
+              </a:rPr>
+              <a:t>データ</a:t>
+            </a:r>
+            <a:endParaRPr kumimoji="1" lang="en-US" altLang="ja-JP" sz="1600" b="1" dirty="0" smtClean="0">
+              <a:latin typeface="+mj-lt"/>
+            </a:endParaRPr>
+          </a:p>
+          <a:p>
+            <a:pPr algn="ctr"/>
+            <a:r>
+              <a:rPr lang="ja-JP" altLang="en-US" sz="1600" b="1" dirty="0" smtClean="0"/>
+              <a:t>ベース</a:t>
+            </a:r>
+            <a:endParaRPr kumimoji="1" lang="ja-JP" altLang="en-US" sz="1600" b="1" dirty="0"/>
+          </a:p>
+        </p:txBody>
+      </p:sp>
+      <p:cxnSp>
+        <p:nvCxnSpPr>
+          <p:cNvPr id="102" name="直線コネクタ 101"/>
+          <p:cNvCxnSpPr/>
           <p:nvPr/>
-        </p:nvGrpSpPr>
-        <p:grpSpPr>
-          <a:xfrm>
-            <a:off x="4651926" y="3140968"/>
-            <a:ext cx="2662081" cy="821115"/>
-            <a:chOff x="5272939" y="853663"/>
-            <a:chExt cx="2197567" cy="821115"/>
-          </a:xfrm>
-        </p:grpSpPr>
-        <p:sp>
-          <p:nvSpPr>
-            <p:cNvPr id="13" name="正方形/長方形 12"/>
-            <p:cNvSpPr/>
-            <p:nvPr/>
-          </p:nvSpPr>
-          <p:spPr>
-            <a:xfrm>
-              <a:off x="5454281" y="1026706"/>
-              <a:ext cx="2016225" cy="648072"/>
-            </a:xfrm>
-            <a:prstGeom prst="rect">
-              <a:avLst/>
-            </a:prstGeom>
-            <a:gradFill flip="none" rotWithShape="1">
-              <a:gsLst>
-                <a:gs pos="100000">
-                  <a:srgbClr val="FFFF00"/>
-                </a:gs>
-                <a:gs pos="0">
-                  <a:schemeClr val="accent3">
-                    <a:tint val="37000"/>
-                    <a:satMod val="300000"/>
-                  </a:schemeClr>
-                </a:gs>
-                <a:gs pos="45000">
-                  <a:schemeClr val="accent3">
-                    <a:tint val="15000"/>
-                    <a:satMod val="350000"/>
-                    <a:lumMod val="0"/>
-                    <a:lumOff val="100000"/>
-                  </a:schemeClr>
-                </a:gs>
-              </a:gsLst>
-              <a:lin ang="5400000" scaled="0"/>
-              <a:tileRect/>
-            </a:gradFill>
-            <a:ln>
-              <a:solidFill>
-                <a:srgbClr val="FFFF00"/>
-              </a:solidFill>
-            </a:ln>
-          </p:spPr>
-          <p:style>
-            <a:lnRef idx="1">
-              <a:schemeClr val="accent2"/>
-            </a:lnRef>
-            <a:fillRef idx="2">
-              <a:schemeClr val="accent2"/>
-            </a:fillRef>
-            <a:effectRef idx="1">
-              <a:schemeClr val="accent2"/>
-            </a:effectRef>
-            <a:fontRef idx="minor">
-              <a:schemeClr val="dk1"/>
-            </a:fontRef>
-          </p:style>
-          <p:txBody>
-            <a:bodyPr rtlCol="0" anchor="ctr"/>
-            <a:lstStyle/>
-            <a:p>
-              <a:pPr algn="ctr"/>
-              <a:endParaRPr kumimoji="1" lang="ja-JP" altLang="en-US" dirty="0">
-                <a:solidFill>
-                  <a:schemeClr val="tx1"/>
-                </a:solidFill>
-              </a:endParaRPr>
-            </a:p>
-          </p:txBody>
-        </p:sp>
-        <p:sp>
-          <p:nvSpPr>
-            <p:cNvPr id="14" name="正方形/長方形 13"/>
-            <p:cNvSpPr/>
-            <p:nvPr/>
-          </p:nvSpPr>
-          <p:spPr>
-            <a:xfrm>
-              <a:off x="5379950" y="936557"/>
-              <a:ext cx="2016224" cy="648072"/>
-            </a:xfrm>
-            <a:prstGeom prst="rect">
-              <a:avLst/>
-            </a:prstGeom>
-            <a:gradFill flip="none" rotWithShape="1">
-              <a:gsLst>
-                <a:gs pos="100000">
-                  <a:srgbClr val="FFFF00"/>
-                </a:gs>
-                <a:gs pos="0">
-                  <a:schemeClr val="accent3">
-                    <a:tint val="37000"/>
-                    <a:satMod val="300000"/>
-                  </a:schemeClr>
-                </a:gs>
-                <a:gs pos="45000">
-                  <a:schemeClr val="accent3">
-                    <a:tint val="15000"/>
-                    <a:satMod val="350000"/>
-                    <a:lumMod val="0"/>
-                    <a:lumOff val="100000"/>
-                  </a:schemeClr>
-                </a:gs>
-              </a:gsLst>
-              <a:lin ang="5400000" scaled="0"/>
-              <a:tileRect/>
-            </a:gradFill>
-            <a:ln>
-              <a:solidFill>
-                <a:srgbClr val="FFFF00"/>
-              </a:solidFill>
-            </a:ln>
-          </p:spPr>
-          <p:style>
-            <a:lnRef idx="1">
-              <a:schemeClr val="accent2"/>
-            </a:lnRef>
-            <a:fillRef idx="2">
-              <a:schemeClr val="accent2"/>
-            </a:fillRef>
-            <a:effectRef idx="1">
-              <a:schemeClr val="accent2"/>
-            </a:effectRef>
-            <a:fontRef idx="minor">
-              <a:schemeClr val="dk1"/>
-            </a:fontRef>
-          </p:style>
-          <p:txBody>
-            <a:bodyPr rtlCol="0" anchor="ctr"/>
-            <a:lstStyle/>
-            <a:p>
-              <a:pPr algn="ctr"/>
-              <a:endParaRPr kumimoji="1" lang="ja-JP" altLang="en-US" dirty="0">
-                <a:solidFill>
-                  <a:schemeClr val="tx1"/>
-                </a:solidFill>
-              </a:endParaRPr>
-            </a:p>
-          </p:txBody>
-        </p:sp>
-        <p:sp>
-          <p:nvSpPr>
-            <p:cNvPr id="5" name="正方形/長方形 4"/>
-            <p:cNvSpPr/>
-            <p:nvPr/>
-          </p:nvSpPr>
-          <p:spPr>
-            <a:xfrm>
-              <a:off x="5272939" y="853663"/>
-              <a:ext cx="2016224" cy="648072"/>
-            </a:xfrm>
-            <a:prstGeom prst="rect">
-              <a:avLst/>
-            </a:prstGeom>
-            <a:gradFill flip="none" rotWithShape="1">
-              <a:gsLst>
-                <a:gs pos="100000">
-                  <a:srgbClr val="FFFF00"/>
-                </a:gs>
-                <a:gs pos="0">
-                  <a:schemeClr val="accent3">
-                    <a:tint val="37000"/>
-                    <a:satMod val="300000"/>
-                  </a:schemeClr>
-                </a:gs>
-                <a:gs pos="45000">
-                  <a:schemeClr val="accent3">
-                    <a:tint val="15000"/>
-                    <a:satMod val="350000"/>
-                    <a:lumMod val="0"/>
-                    <a:lumOff val="100000"/>
-                  </a:schemeClr>
-                </a:gs>
-              </a:gsLst>
-              <a:lin ang="5400000" scaled="0"/>
-              <a:tileRect/>
-            </a:gradFill>
-            <a:ln>
-              <a:solidFill>
-                <a:srgbClr val="FFFF00"/>
-              </a:solidFill>
-            </a:ln>
-          </p:spPr>
-          <p:style>
-            <a:lnRef idx="1">
-              <a:schemeClr val="accent2"/>
-            </a:lnRef>
-            <a:fillRef idx="2">
-              <a:schemeClr val="accent2"/>
-            </a:fillRef>
-            <a:effectRef idx="1">
-              <a:schemeClr val="accent2"/>
-            </a:effectRef>
-            <a:fontRef idx="minor">
-              <a:schemeClr val="dk1"/>
-            </a:fontRef>
-          </p:style>
-          <p:txBody>
-            <a:bodyPr rtlCol="0" anchor="ctr"/>
-            <a:lstStyle/>
-            <a:p>
-              <a:pPr algn="ctr"/>
-              <a:r>
-                <a:rPr kumimoji="1" lang="en-US" altLang="ja-JP" b="1" dirty="0" smtClean="0">
-                  <a:solidFill>
-                    <a:schemeClr val="tx1"/>
-                  </a:solidFill>
-                </a:rPr>
-                <a:t>Bean</a:t>
-              </a:r>
-              <a:r>
-                <a:rPr kumimoji="1" lang="ja-JP" altLang="en-US" b="1" dirty="0" smtClean="0">
-                  <a:solidFill>
-                    <a:schemeClr val="tx1"/>
-                  </a:solidFill>
-                </a:rPr>
-                <a:t>定義ファイル</a:t>
-              </a:r>
-              <a:endParaRPr kumimoji="1" lang="ja-JP" altLang="en-US" b="1" dirty="0">
-                <a:solidFill>
-                  <a:schemeClr val="tx1"/>
-                </a:solidFill>
-              </a:endParaRPr>
-            </a:p>
-          </p:txBody>
-        </p:sp>
-      </p:grpSp>
-      <p:grpSp>
-        <p:nvGrpSpPr>
-          <p:cNvPr id="9" name="グループ化 8"/>
-          <p:cNvGrpSpPr/>
-          <p:nvPr/>
-        </p:nvGrpSpPr>
-        <p:grpSpPr>
-          <a:xfrm>
-            <a:off x="6121952" y="4427165"/>
-            <a:ext cx="1568337" cy="577642"/>
-            <a:chOff x="2087723" y="2661561"/>
-            <a:chExt cx="1568337" cy="577642"/>
-          </a:xfrm>
-        </p:grpSpPr>
-        <p:sp>
-          <p:nvSpPr>
-            <p:cNvPr id="18" name="正方形/長方形 17"/>
-            <p:cNvSpPr/>
-            <p:nvPr/>
-          </p:nvSpPr>
-          <p:spPr>
-            <a:xfrm>
-              <a:off x="2175571" y="2759796"/>
-              <a:ext cx="1480489" cy="479407"/>
-            </a:xfrm>
-            <a:prstGeom prst="rect">
-              <a:avLst/>
-            </a:prstGeom>
-            <a:gradFill flip="none" rotWithShape="1">
-              <a:gsLst>
-                <a:gs pos="0">
-                  <a:srgbClr val="25FB25"/>
-                </a:gs>
-                <a:gs pos="100000">
-                  <a:srgbClr val="74E689"/>
-                </a:gs>
-                <a:gs pos="100000">
-                  <a:schemeClr val="accent1">
-                    <a:tint val="44500"/>
-                    <a:satMod val="160000"/>
-                  </a:schemeClr>
-                </a:gs>
-                <a:gs pos="62000">
-                  <a:schemeClr val="accent1">
-                    <a:tint val="23500"/>
-                    <a:satMod val="160000"/>
-                  </a:schemeClr>
-                </a:gs>
-              </a:gsLst>
-              <a:lin ang="5400000" scaled="1"/>
-              <a:tileRect/>
-            </a:gradFill>
-            <a:ln>
-              <a:solidFill>
-                <a:srgbClr val="25FB25"/>
-              </a:solidFill>
-            </a:ln>
-          </p:spPr>
-          <p:style>
-            <a:lnRef idx="2">
-              <a:schemeClr val="accent1">
-                <a:shade val="50000"/>
-              </a:schemeClr>
-            </a:lnRef>
-            <a:fillRef idx="1">
-              <a:schemeClr val="accent1"/>
-            </a:fillRef>
-            <a:effectRef idx="0">
-              <a:schemeClr val="accent1"/>
-            </a:effectRef>
-            <a:fontRef idx="minor">
-              <a:schemeClr val="lt1"/>
-            </a:fontRef>
-          </p:style>
-          <p:txBody>
-            <a:bodyPr rtlCol="0" anchor="ctr"/>
-            <a:lstStyle/>
-            <a:p>
-              <a:pPr algn="ctr"/>
-              <a:endParaRPr kumimoji="1" lang="ja-JP" altLang="en-US" sz="1600" b="1" dirty="0">
-                <a:solidFill>
-                  <a:schemeClr val="tx1"/>
-                </a:solidFill>
-              </a:endParaRPr>
-            </a:p>
-          </p:txBody>
-        </p:sp>
-        <p:sp>
-          <p:nvSpPr>
-            <p:cNvPr id="17" name="正方形/長方形 16"/>
-            <p:cNvSpPr/>
-            <p:nvPr/>
-          </p:nvSpPr>
-          <p:spPr>
-            <a:xfrm>
-              <a:off x="2127323" y="2724268"/>
-              <a:ext cx="1480489" cy="479407"/>
-            </a:xfrm>
-            <a:prstGeom prst="rect">
-              <a:avLst/>
-            </a:prstGeom>
-            <a:gradFill flip="none" rotWithShape="1">
-              <a:gsLst>
-                <a:gs pos="0">
-                  <a:srgbClr val="25FB25"/>
-                </a:gs>
-                <a:gs pos="100000">
-                  <a:srgbClr val="74E689"/>
-                </a:gs>
-                <a:gs pos="100000">
-                  <a:schemeClr val="accent1">
-                    <a:tint val="44500"/>
-                    <a:satMod val="160000"/>
-                  </a:schemeClr>
-                </a:gs>
-                <a:gs pos="62000">
-                  <a:schemeClr val="accent1">
-                    <a:tint val="23500"/>
-                    <a:satMod val="160000"/>
-                  </a:schemeClr>
-                </a:gs>
-              </a:gsLst>
-              <a:lin ang="5400000" scaled="1"/>
-              <a:tileRect/>
-            </a:gradFill>
-            <a:ln>
-              <a:solidFill>
-                <a:srgbClr val="25FB25"/>
-              </a:solidFill>
-            </a:ln>
-          </p:spPr>
-          <p:style>
-            <a:lnRef idx="2">
-              <a:schemeClr val="accent1">
-                <a:shade val="50000"/>
-              </a:schemeClr>
-            </a:lnRef>
-            <a:fillRef idx="1">
-              <a:schemeClr val="accent1"/>
-            </a:fillRef>
-            <a:effectRef idx="0">
-              <a:schemeClr val="accent1"/>
-            </a:effectRef>
-            <a:fontRef idx="minor">
-              <a:schemeClr val="lt1"/>
-            </a:fontRef>
-          </p:style>
-          <p:txBody>
-            <a:bodyPr rtlCol="0" anchor="ctr"/>
-            <a:lstStyle/>
-            <a:p>
-              <a:pPr algn="ctr"/>
-              <a:endParaRPr kumimoji="1" lang="ja-JP" altLang="en-US" sz="1600" b="1" dirty="0">
-                <a:solidFill>
-                  <a:schemeClr val="tx1"/>
-                </a:solidFill>
-              </a:endParaRPr>
-            </a:p>
-          </p:txBody>
-        </p:sp>
-        <p:sp>
-          <p:nvSpPr>
-            <p:cNvPr id="16" name="正方形/長方形 15"/>
-            <p:cNvSpPr/>
-            <p:nvPr/>
-          </p:nvSpPr>
-          <p:spPr>
-            <a:xfrm>
-              <a:off x="2087723" y="2661561"/>
-              <a:ext cx="1480489" cy="479407"/>
-            </a:xfrm>
-            <a:prstGeom prst="rect">
-              <a:avLst/>
-            </a:prstGeom>
-            <a:gradFill flip="none" rotWithShape="1">
-              <a:gsLst>
-                <a:gs pos="0">
-                  <a:srgbClr val="25FB25"/>
-                </a:gs>
-                <a:gs pos="100000">
-                  <a:srgbClr val="74E689"/>
-                </a:gs>
-                <a:gs pos="100000">
-                  <a:schemeClr val="accent1">
-                    <a:tint val="44500"/>
-                    <a:satMod val="160000"/>
-                  </a:schemeClr>
-                </a:gs>
-                <a:gs pos="62000">
-                  <a:schemeClr val="accent1">
-                    <a:tint val="23500"/>
-                    <a:satMod val="160000"/>
-                  </a:schemeClr>
-                </a:gs>
-              </a:gsLst>
-              <a:lin ang="5400000" scaled="1"/>
-              <a:tileRect/>
-            </a:gradFill>
-            <a:ln>
-              <a:solidFill>
-                <a:srgbClr val="25FB25"/>
-              </a:solidFill>
-            </a:ln>
-          </p:spPr>
-          <p:style>
-            <a:lnRef idx="2">
-              <a:schemeClr val="accent1">
-                <a:shade val="50000"/>
-              </a:schemeClr>
-            </a:lnRef>
-            <a:fillRef idx="1">
-              <a:schemeClr val="accent1"/>
-            </a:fillRef>
-            <a:effectRef idx="0">
-              <a:schemeClr val="accent1"/>
-            </a:effectRef>
-            <a:fontRef idx="minor">
-              <a:schemeClr val="lt1"/>
-            </a:fontRef>
-          </p:style>
-          <p:txBody>
-            <a:bodyPr rtlCol="0" anchor="ctr"/>
-            <a:lstStyle/>
-            <a:p>
-              <a:pPr algn="ctr"/>
-              <a:r>
-                <a:rPr kumimoji="1" lang="en-US" altLang="ja-JP" sz="1600" b="1" dirty="0" smtClean="0">
-                  <a:solidFill>
-                    <a:schemeClr val="tx1"/>
-                  </a:solidFill>
-                </a:rPr>
-                <a:t>SQL</a:t>
-              </a:r>
-              <a:r>
-                <a:rPr kumimoji="1" lang="ja-JP" altLang="en-US" sz="1600" b="1" dirty="0" smtClean="0">
-                  <a:solidFill>
-                    <a:schemeClr val="tx1"/>
-                  </a:solidFill>
-                </a:rPr>
-                <a:t> </a:t>
-              </a:r>
-              <a:r>
-                <a:rPr kumimoji="1" lang="en-US" altLang="ja-JP" sz="1600" b="1" dirty="0" smtClean="0">
-                  <a:solidFill>
-                    <a:schemeClr val="tx1"/>
-                  </a:solidFill>
-                </a:rPr>
-                <a:t>MAPPER</a:t>
-              </a:r>
-            </a:p>
-            <a:p>
-              <a:pPr algn="ctr"/>
-              <a:r>
-                <a:rPr lang="ja-JP" altLang="en-US" sz="1600" b="1" dirty="0">
-                  <a:solidFill>
-                    <a:schemeClr val="tx1"/>
-                  </a:solidFill>
-                </a:rPr>
-                <a:t>ファイル</a:t>
-              </a:r>
-              <a:endParaRPr kumimoji="1" lang="ja-JP" altLang="en-US" sz="1600" b="1" dirty="0">
-                <a:solidFill>
-                  <a:schemeClr val="tx1"/>
-                </a:solidFill>
-              </a:endParaRPr>
-            </a:p>
-          </p:txBody>
-        </p:sp>
-      </p:grpSp>
-      <p:sp>
-        <p:nvSpPr>
-          <p:cNvPr id="21" name="四角形吹き出し 20"/>
-          <p:cNvSpPr/>
-          <p:nvPr/>
-        </p:nvSpPr>
-        <p:spPr>
-          <a:xfrm>
-            <a:off x="6332085" y="2621319"/>
-            <a:ext cx="2592288" cy="360040"/>
-          </a:xfrm>
-          <a:prstGeom prst="wedgeRectCallout">
-            <a:avLst>
-              <a:gd name="adj1" fmla="val -34158"/>
-              <a:gd name="adj2" fmla="val 89078"/>
-            </a:avLst>
+        </p:nvCxnSpPr>
+        <p:spPr>
+          <a:xfrm flipH="1">
+            <a:off x="8011687" y="1448744"/>
+            <a:ext cx="1" cy="3790006"/>
+          </a:xfrm>
+          <a:prstGeom prst="line">
+            <a:avLst/>
           </a:prstGeom>
           <a:ln>
             <a:solidFill>
-              <a:schemeClr val="tx1"/>
+              <a:schemeClr val="tx1">
+                <a:lumMod val="50000"/>
+                <a:lumOff val="50000"/>
+              </a:schemeClr>
             </a:solidFill>
           </a:ln>
+        </p:spPr>
+        <p:style>
+          <a:lnRef idx="2">
+            <a:schemeClr val="accent1"/>
+          </a:lnRef>
+          <a:fillRef idx="0">
+            <a:schemeClr val="accent1"/>
+          </a:fillRef>
+          <a:effectRef idx="1">
+            <a:schemeClr val="accent1"/>
+          </a:effectRef>
+          <a:fontRef idx="minor">
+            <a:schemeClr val="tx1"/>
+          </a:fontRef>
+        </p:style>
+      </p:cxnSp>
+      <p:sp>
+        <p:nvSpPr>
+          <p:cNvPr id="103" name="右矢印 102"/>
+          <p:cNvSpPr/>
+          <p:nvPr/>
+        </p:nvSpPr>
+        <p:spPr>
+          <a:xfrm>
+            <a:off x="5794008" y="3817830"/>
+            <a:ext cx="2150030" cy="295275"/>
+          </a:xfrm>
+          <a:prstGeom prst="rightArrow">
+            <a:avLst/>
+          </a:prstGeom>
+          <a:ln/>
+        </p:spPr>
+        <p:style>
+          <a:lnRef idx="1">
+            <a:schemeClr val="dk1"/>
+          </a:lnRef>
+          <a:fillRef idx="2">
+            <a:schemeClr val="dk1"/>
+          </a:fillRef>
+          <a:effectRef idx="1">
+            <a:schemeClr val="dk1"/>
+          </a:effectRef>
+          <a:fontRef idx="minor">
+            <a:schemeClr val="dk1"/>
+          </a:fontRef>
+        </p:style>
+        <p:txBody>
+          <a:bodyPr rot="0" spcFirstLastPara="0" vertOverflow="overflow" horzOverflow="overflow" vert="horz" wrap="square" lIns="91440" tIns="45720" rIns="91440" bIns="45720" numCol="1" spcCol="0" rtlCol="0" fromWordArt="0" anchor="ctr" anchorCtr="0" forceAA="0" compatLnSpc="1">
+            <a:prstTxWarp prst="textNoShape">
+              <a:avLst/>
+            </a:prstTxWarp>
+            <a:noAutofit/>
+          </a:bodyPr>
+          <a:lstStyle/>
+          <a:p>
+            <a:pPr algn="ctr"/>
+            <a:endParaRPr kumimoji="1" lang="ja-JP" altLang="en-US"/>
+          </a:p>
+        </p:txBody>
+      </p:sp>
+      <p:sp>
+        <p:nvSpPr>
+          <p:cNvPr id="104" name="角丸四角形 103"/>
+          <p:cNvSpPr/>
+          <p:nvPr/>
+        </p:nvSpPr>
+        <p:spPr>
+          <a:xfrm>
+            <a:off x="7928312" y="3799707"/>
+            <a:ext cx="165600" cy="442913"/>
+          </a:xfrm>
+          <a:prstGeom prst="roundRect">
+            <a:avLst/>
+          </a:prstGeom>
+          <a:ln/>
+        </p:spPr>
+        <p:style>
+          <a:lnRef idx="1">
+            <a:schemeClr val="dk1"/>
+          </a:lnRef>
+          <a:fillRef idx="2">
+            <a:schemeClr val="dk1"/>
+          </a:fillRef>
+          <a:effectRef idx="1">
+            <a:schemeClr val="dk1"/>
+          </a:effectRef>
+          <a:fontRef idx="minor">
+            <a:schemeClr val="dk1"/>
+          </a:fontRef>
+        </p:style>
+        <p:txBody>
+          <a:bodyPr rot="0" spcFirstLastPara="0" vertOverflow="overflow" horzOverflow="overflow" vert="horz" wrap="square" lIns="91440" tIns="45720" rIns="91440" bIns="45720" numCol="1" spcCol="0" rtlCol="0" fromWordArt="0" anchor="ctr" anchorCtr="0" forceAA="0" compatLnSpc="1">
+            <a:prstTxWarp prst="textNoShape">
+              <a:avLst/>
+            </a:prstTxWarp>
+            <a:noAutofit/>
+          </a:bodyPr>
+          <a:lstStyle/>
+          <a:p>
+            <a:pPr algn="ctr"/>
+            <a:endParaRPr kumimoji="1" lang="ja-JP" altLang="en-US"/>
+          </a:p>
+        </p:txBody>
+      </p:sp>
+      <p:sp>
+        <p:nvSpPr>
+          <p:cNvPr id="109" name="正方形/長方形 108"/>
+          <p:cNvSpPr/>
+          <p:nvPr/>
+        </p:nvSpPr>
+        <p:spPr>
+          <a:xfrm>
+            <a:off x="5741742" y="3518897"/>
+            <a:ext cx="2901755" cy="338554"/>
+          </a:xfrm>
+          <a:prstGeom prst="rect">
+            <a:avLst/>
+          </a:prstGeom>
+        </p:spPr>
+        <p:txBody>
+          <a:bodyPr wrap="none">
+            <a:spAutoFit/>
+          </a:bodyPr>
+          <a:lstStyle/>
+          <a:p>
+            <a:pPr algn="ctr"/>
+            <a:r>
+              <a:rPr lang="en-US" altLang="ja-JP" sz="1600" b="1" dirty="0" smtClean="0"/>
+              <a:t>(4)</a:t>
+            </a:r>
+            <a:r>
+              <a:rPr lang="ja-JP" altLang="en-US" sz="1600" b="1" dirty="0" smtClean="0"/>
+              <a:t>データベースアクセスの実行</a:t>
+            </a:r>
+            <a:endParaRPr lang="ja-JP" altLang="en-US" sz="1600" b="1" dirty="0"/>
+          </a:p>
+        </p:txBody>
+      </p:sp>
+      <p:sp>
+        <p:nvSpPr>
+          <p:cNvPr id="110" name="角丸四角形 109"/>
+          <p:cNvSpPr/>
+          <p:nvPr/>
+        </p:nvSpPr>
+        <p:spPr>
+          <a:xfrm>
+            <a:off x="5802031" y="6097988"/>
+            <a:ext cx="1396838" cy="537104"/>
+          </a:xfrm>
+          <a:prstGeom prst="roundRect">
+            <a:avLst/>
+          </a:prstGeom>
         </p:spPr>
         <p:style>
           <a:lnRef idx="1">
@@ -4500,72 +4849,47 @@
           <a:p>
             <a:pPr algn="ctr"/>
             <a:r>
-              <a:rPr kumimoji="1" lang="en-US" altLang="ja-JP" sz="1200" b="1" dirty="0" smtClean="0"/>
-              <a:t>(</a:t>
-            </a:r>
-            <a:r>
-              <a:rPr lang="en-US" altLang="ja-JP" sz="1200" b="1" dirty="0" smtClean="0"/>
-              <a:t>5</a:t>
-            </a:r>
-            <a:r>
-              <a:rPr kumimoji="1" lang="en-US" altLang="ja-JP" sz="1200" b="1" dirty="0" smtClean="0"/>
-              <a:t>)DAO</a:t>
-            </a:r>
-            <a:r>
-              <a:rPr lang="ja-JP" altLang="en-US" sz="1200" b="1" dirty="0" smtClean="0"/>
-              <a:t>実装クラス</a:t>
-            </a:r>
-            <a:r>
-              <a:rPr kumimoji="1" lang="ja-JP" altLang="en-US" sz="1200" b="1" dirty="0" smtClean="0"/>
-              <a:t>の</a:t>
-            </a:r>
-            <a:r>
-              <a:rPr kumimoji="1" lang="en-US" altLang="ja-JP" sz="1200" b="1" dirty="0" smtClean="0"/>
-              <a:t>Bean</a:t>
-            </a:r>
-            <a:r>
-              <a:rPr kumimoji="1" lang="ja-JP" altLang="en-US" sz="1200" b="1" dirty="0" smtClean="0"/>
-              <a:t>定義</a:t>
-            </a:r>
-            <a:endParaRPr kumimoji="1" lang="ja-JP" altLang="en-US" sz="1200" b="1" dirty="0"/>
-          </a:p>
-        </p:txBody>
-      </p:sp>
-      <p:sp>
-        <p:nvSpPr>
-          <p:cNvPr id="22" name="四角形吹き出し 21"/>
+              <a:rPr lang="en-US" altLang="ja-JP" sz="1400" b="1" dirty="0" smtClean="0"/>
+              <a:t>MyBatis3</a:t>
+            </a:r>
+          </a:p>
+          <a:p>
+            <a:pPr algn="ctr"/>
+            <a:r>
+              <a:rPr lang="ja-JP" altLang="en-US" sz="1400" b="1" dirty="0"/>
+              <a:t>提供</a:t>
+            </a:r>
+            <a:endParaRPr lang="en-US" altLang="ja-JP" sz="1400" b="1" dirty="0" smtClean="0"/>
+          </a:p>
+        </p:txBody>
+      </p:sp>
+      <p:sp>
+        <p:nvSpPr>
+          <p:cNvPr id="111" name="角丸四角形 110"/>
           <p:cNvSpPr/>
           <p:nvPr/>
         </p:nvSpPr>
         <p:spPr>
           <a:xfrm>
-            <a:off x="1119692" y="1322633"/>
-            <a:ext cx="2304256" cy="360040"/>
-          </a:xfrm>
-          <a:prstGeom prst="wedgeRectCallout">
-            <a:avLst>
-              <a:gd name="adj1" fmla="val -34158"/>
-              <a:gd name="adj2" fmla="val 89078"/>
-            </a:avLst>
+            <a:off x="7444691" y="6097988"/>
+            <a:ext cx="1396837" cy="537103"/>
+          </a:xfrm>
+          <a:prstGeom prst="roundRect">
+            <a:avLst/>
           </a:prstGeom>
-          <a:ln>
-            <a:solidFill>
-              <a:schemeClr val="tx1"/>
-            </a:solidFill>
-          </a:ln>
         </p:spPr>
         <p:style>
           <a:lnRef idx="1">
-            <a:schemeClr val="accent1"/>
+            <a:schemeClr val="accent4"/>
           </a:lnRef>
-          <a:fillRef idx="2">
-            <a:schemeClr val="accent1"/>
+          <a:fillRef idx="3">
+            <a:schemeClr val="accent4"/>
           </a:fillRef>
-          <a:effectRef idx="1">
-            <a:schemeClr val="accent1"/>
+          <a:effectRef idx="2">
+            <a:schemeClr val="accent4"/>
           </a:effectRef>
           <a:fontRef idx="minor">
-            <a:schemeClr val="dk1"/>
+            <a:schemeClr val="lt1"/>
           </a:fontRef>
         </p:style>
         <p:txBody>
@@ -4574,204 +4898,38 @@
           <a:p>
             <a:pPr algn="ctr"/>
             <a:r>
-              <a:rPr kumimoji="1" lang="en-US" altLang="ja-JP" sz="1200" b="1" dirty="0" smtClean="0"/>
-              <a:t>(1)DAO</a:t>
-            </a:r>
-            <a:r>
-              <a:rPr kumimoji="1" lang="ja-JP" altLang="en-US" sz="1200" b="1" dirty="0" smtClean="0"/>
-              <a:t>インタフェースの定義</a:t>
-            </a:r>
-            <a:endParaRPr kumimoji="1" lang="ja-JP" altLang="en-US" sz="1200" b="1" dirty="0"/>
-          </a:p>
-        </p:txBody>
-      </p:sp>
-      <p:sp>
-        <p:nvSpPr>
-          <p:cNvPr id="23" name="四角形吹き出し 22"/>
-          <p:cNvSpPr/>
-          <p:nvPr/>
-        </p:nvSpPr>
-        <p:spPr>
-          <a:xfrm>
-            <a:off x="3755720" y="1326242"/>
-            <a:ext cx="2304256" cy="360040"/>
-          </a:xfrm>
-          <a:prstGeom prst="wedgeRectCallout">
-            <a:avLst>
-              <a:gd name="adj1" fmla="val -34158"/>
-              <a:gd name="adj2" fmla="val 89078"/>
-            </a:avLst>
-          </a:prstGeom>
-          <a:ln>
-            <a:solidFill>
-              <a:schemeClr val="tx1"/>
-            </a:solidFill>
-          </a:ln>
-        </p:spPr>
-        <p:style>
-          <a:lnRef idx="1">
-            <a:schemeClr val="accent1"/>
-          </a:lnRef>
-          <a:fillRef idx="2">
-            <a:schemeClr val="accent1"/>
-          </a:fillRef>
-          <a:effectRef idx="1">
-            <a:schemeClr val="accent1"/>
-          </a:effectRef>
-          <a:fontRef idx="minor">
-            <a:schemeClr val="dk1"/>
-          </a:fontRef>
-        </p:style>
-        <p:txBody>
-          <a:bodyPr rtlCol="0" anchor="ctr"/>
-          <a:lstStyle/>
+              <a:rPr lang="ja-JP" altLang="en-US" sz="1400" b="1" dirty="0" smtClean="0"/>
+              <a:t>開発者が</a:t>
+            </a:r>
+            <a:endParaRPr lang="en-US" altLang="ja-JP" sz="1400" b="1" dirty="0" smtClean="0"/>
+          </a:p>
           <a:p>
             <a:pPr algn="ctr"/>
             <a:r>
-              <a:rPr kumimoji="1" lang="en-US" altLang="ja-JP" sz="1200" b="1" dirty="0" smtClean="0"/>
-              <a:t>(6)DI</a:t>
-            </a:r>
-            <a:r>
-              <a:rPr kumimoji="1" lang="ja-JP" altLang="en-US" sz="1200" b="1" dirty="0" smtClean="0"/>
-              <a:t>コンテナによる設定</a:t>
-            </a:r>
-            <a:endParaRPr kumimoji="1" lang="ja-JP" altLang="en-US" sz="1200" b="1" dirty="0"/>
-          </a:p>
-        </p:txBody>
-      </p:sp>
-      <p:sp>
-        <p:nvSpPr>
-          <p:cNvPr id="25" name="四角形吹き出し 24"/>
-          <p:cNvSpPr/>
-          <p:nvPr/>
-        </p:nvSpPr>
-        <p:spPr>
-          <a:xfrm>
-            <a:off x="6660232" y="5137524"/>
-            <a:ext cx="1705884" cy="360040"/>
-          </a:xfrm>
-          <a:prstGeom prst="wedgeRectCallout">
-            <a:avLst>
-              <a:gd name="adj1" fmla="val -33814"/>
-              <a:gd name="adj2" fmla="val -123959"/>
-            </a:avLst>
-          </a:prstGeom>
-          <a:ln>
-            <a:solidFill>
-              <a:schemeClr val="tx1"/>
-            </a:solidFill>
-          </a:ln>
-        </p:spPr>
-        <p:style>
-          <a:lnRef idx="1">
-            <a:schemeClr val="accent1"/>
-          </a:lnRef>
-          <a:fillRef idx="2">
-            <a:schemeClr val="accent1"/>
-          </a:fillRef>
-          <a:effectRef idx="1">
-            <a:schemeClr val="accent1"/>
-          </a:effectRef>
-          <a:fontRef idx="minor">
-            <a:schemeClr val="dk1"/>
-          </a:fontRef>
-        </p:style>
-        <p:txBody>
-          <a:bodyPr rtlCol="0" anchor="ctr"/>
-          <a:lstStyle/>
-          <a:p>
-            <a:pPr algn="ctr"/>
-            <a:r>
-              <a:rPr lang="en-US" altLang="ja-JP" sz="1200" b="1" dirty="0"/>
-              <a:t>(</a:t>
-            </a:r>
-            <a:r>
-              <a:rPr lang="en-US" altLang="ja-JP" sz="1200" b="1" dirty="0" smtClean="0"/>
-              <a:t>4</a:t>
-            </a:r>
-            <a:r>
-              <a:rPr kumimoji="1" lang="en-US" altLang="ja-JP" sz="1200" b="1" dirty="0" smtClean="0"/>
-              <a:t>)SQL</a:t>
-            </a:r>
-            <a:r>
-              <a:rPr lang="ja-JP" altLang="en-US" sz="1200" b="1" dirty="0" smtClean="0"/>
-              <a:t>の設定</a:t>
-            </a:r>
-            <a:endParaRPr kumimoji="1" lang="en-US" altLang="ja-JP" sz="1200" b="1" dirty="0" smtClean="0"/>
-          </a:p>
-        </p:txBody>
-      </p:sp>
-      <p:sp>
-        <p:nvSpPr>
-          <p:cNvPr id="24" name="四角形吹き出し 23"/>
-          <p:cNvSpPr/>
-          <p:nvPr/>
-        </p:nvSpPr>
-        <p:spPr>
-          <a:xfrm>
-            <a:off x="140410" y="2670682"/>
-            <a:ext cx="1881232" cy="360040"/>
-          </a:xfrm>
-          <a:prstGeom prst="wedgeRectCallout">
-            <a:avLst>
-              <a:gd name="adj1" fmla="val 34556"/>
-              <a:gd name="adj2" fmla="val -108045"/>
-            </a:avLst>
-          </a:prstGeom>
-          <a:ln>
-            <a:solidFill>
-              <a:schemeClr val="tx1"/>
-            </a:solidFill>
-          </a:ln>
-        </p:spPr>
-        <p:style>
-          <a:lnRef idx="1">
-            <a:schemeClr val="accent1"/>
-          </a:lnRef>
-          <a:fillRef idx="2">
-            <a:schemeClr val="accent1"/>
-          </a:fillRef>
-          <a:effectRef idx="1">
-            <a:schemeClr val="accent1"/>
-          </a:effectRef>
-          <a:fontRef idx="minor">
-            <a:schemeClr val="dk1"/>
-          </a:fontRef>
-        </p:style>
-        <p:txBody>
-          <a:bodyPr rtlCol="0" anchor="ctr"/>
-          <a:lstStyle/>
-          <a:p>
-            <a:pPr algn="ctr"/>
-            <a:r>
-              <a:rPr kumimoji="1" lang="en-US" altLang="ja-JP" sz="1200" b="1" dirty="0" smtClean="0"/>
-              <a:t>(7)DAO</a:t>
-            </a:r>
-            <a:r>
-              <a:rPr kumimoji="1" lang="ja-JP" altLang="en-US" sz="1200" b="1" dirty="0" smtClean="0"/>
-              <a:t>の実行</a:t>
-            </a:r>
-            <a:endParaRPr kumimoji="1" lang="ja-JP" altLang="en-US" sz="1200" b="1" dirty="0"/>
+              <a:rPr lang="ja-JP" altLang="en-US" sz="1400" b="1" dirty="0"/>
+              <a:t>実装</a:t>
+            </a:r>
+            <a:endParaRPr lang="en-US" altLang="ja-JP" sz="1400" b="1" dirty="0" smtClean="0"/>
           </a:p>
         </p:txBody>
       </p:sp>
       <p:grpSp>
         <p:nvGrpSpPr>
-          <p:cNvPr id="33" name="グループ化 32"/>
+          <p:cNvPr id="43" name="グループ化 42"/>
           <p:cNvGrpSpPr/>
           <p:nvPr/>
         </p:nvGrpSpPr>
         <p:grpSpPr>
           <a:xfrm>
-            <a:off x="4330180" y="4421136"/>
-            <a:ext cx="1568337" cy="577642"/>
+            <a:off x="1387630" y="5661248"/>
+            <a:ext cx="1568337" cy="649650"/>
             <a:chOff x="2087723" y="2661561"/>
             <a:chExt cx="1568337" cy="577642"/>
           </a:xfrm>
         </p:grpSpPr>
         <p:sp>
           <p:nvSpPr>
-            <p:cNvPr id="34" name="正方形/長方形 33"/>
+            <p:cNvPr id="45" name="正方形/長方形 44"/>
             <p:cNvSpPr/>
             <p:nvPr/>
           </p:nvSpPr>
@@ -4783,47 +4941,17 @@
             <a:prstGeom prst="rect">
               <a:avLst/>
             </a:prstGeom>
-            <a:gradFill flip="none" rotWithShape="1">
-              <a:gsLst>
-                <a:gs pos="0">
-                  <a:srgbClr val="25FB25"/>
-                </a:gs>
-                <a:gs pos="100000">
-                  <a:srgbClr val="74E689"/>
-                </a:gs>
-                <a:gs pos="100000">
-                  <a:schemeClr val="accent1">
-                    <a:tint val="44500"/>
-                    <a:satMod val="160000"/>
-                  </a:schemeClr>
-                </a:gs>
-                <a:gs pos="62000">
-                  <a:schemeClr val="accent1">
-                    <a:tint val="23500"/>
-                    <a:satMod val="160000"/>
-                  </a:schemeClr>
-                </a:gs>
-              </a:gsLst>
-              <a:lin ang="5400000" scaled="1"/>
-              <a:tileRect/>
-            </a:gradFill>
-            <a:ln>
-              <a:solidFill>
-                <a:srgbClr val="25FB25"/>
-              </a:solidFill>
-            </a:ln>
+            <a:ln/>
           </p:spPr>
           <p:style>
-            <a:lnRef idx="2">
-              <a:schemeClr val="accent1">
-                <a:shade val="50000"/>
-              </a:schemeClr>
+            <a:lnRef idx="1">
+              <a:schemeClr val="accent4"/>
             </a:lnRef>
-            <a:fillRef idx="1">
-              <a:schemeClr val="accent1"/>
+            <a:fillRef idx="3">
+              <a:schemeClr val="accent4"/>
             </a:fillRef>
-            <a:effectRef idx="0">
-              <a:schemeClr val="accent1"/>
+            <a:effectRef idx="2">
+              <a:schemeClr val="accent4"/>
             </a:effectRef>
             <a:fontRef idx="minor">
               <a:schemeClr val="lt1"/>
@@ -4836,7 +4964,7 @@
               <a:pPr algn="ctr"/>
               <a:endParaRPr kumimoji="1" lang="ja-JP" altLang="en-US" sz="1600" b="1" dirty="0">
                 <a:solidFill>
-                  <a:schemeClr val="tx1"/>
+                  <a:schemeClr val="bg1"/>
                 </a:solidFill>
               </a:endParaRPr>
             </a:p>
@@ -4844,7 +4972,7 @@
         </p:sp>
         <p:sp>
           <p:nvSpPr>
-            <p:cNvPr id="35" name="正方形/長方形 34"/>
+            <p:cNvPr id="46" name="正方形/長方形 45"/>
             <p:cNvSpPr/>
             <p:nvPr/>
           </p:nvSpPr>
@@ -4856,47 +4984,17 @@
             <a:prstGeom prst="rect">
               <a:avLst/>
             </a:prstGeom>
-            <a:gradFill flip="none" rotWithShape="1">
-              <a:gsLst>
-                <a:gs pos="0">
-                  <a:srgbClr val="25FB25"/>
-                </a:gs>
-                <a:gs pos="100000">
-                  <a:srgbClr val="74E689"/>
-                </a:gs>
-                <a:gs pos="100000">
-                  <a:schemeClr val="accent1">
-                    <a:tint val="44500"/>
-                    <a:satMod val="160000"/>
-                  </a:schemeClr>
-                </a:gs>
-                <a:gs pos="62000">
-                  <a:schemeClr val="accent1">
-                    <a:tint val="23500"/>
-                    <a:satMod val="160000"/>
-                  </a:schemeClr>
-                </a:gs>
-              </a:gsLst>
-              <a:lin ang="5400000" scaled="1"/>
-              <a:tileRect/>
-            </a:gradFill>
-            <a:ln>
-              <a:solidFill>
-                <a:srgbClr val="25FB25"/>
-              </a:solidFill>
-            </a:ln>
+            <a:ln/>
           </p:spPr>
           <p:style>
-            <a:lnRef idx="2">
-              <a:schemeClr val="accent1">
-                <a:shade val="50000"/>
-              </a:schemeClr>
+            <a:lnRef idx="1">
+              <a:schemeClr val="accent4"/>
             </a:lnRef>
-            <a:fillRef idx="1">
-              <a:schemeClr val="accent1"/>
+            <a:fillRef idx="3">
+              <a:schemeClr val="accent4"/>
             </a:fillRef>
-            <a:effectRef idx="0">
-              <a:schemeClr val="accent1"/>
+            <a:effectRef idx="2">
+              <a:schemeClr val="accent4"/>
             </a:effectRef>
             <a:fontRef idx="minor">
               <a:schemeClr val="lt1"/>
@@ -4909,7 +5007,7 @@
               <a:pPr algn="ctr"/>
               <a:endParaRPr kumimoji="1" lang="ja-JP" altLang="en-US" sz="1600" b="1" dirty="0">
                 <a:solidFill>
-                  <a:schemeClr val="tx1"/>
+                  <a:schemeClr val="bg1"/>
                 </a:solidFill>
               </a:endParaRPr>
             </a:p>
@@ -4917,7 +5015,7 @@
         </p:sp>
         <p:sp>
           <p:nvSpPr>
-            <p:cNvPr id="36" name="正方形/長方形 35"/>
+            <p:cNvPr id="48" name="正方形/長方形 47"/>
             <p:cNvSpPr/>
             <p:nvPr/>
           </p:nvSpPr>
@@ -4929,47 +5027,17 @@
             <a:prstGeom prst="rect">
               <a:avLst/>
             </a:prstGeom>
-            <a:gradFill flip="none" rotWithShape="1">
-              <a:gsLst>
-                <a:gs pos="0">
-                  <a:srgbClr val="25FB25"/>
-                </a:gs>
-                <a:gs pos="100000">
-                  <a:srgbClr val="74E689"/>
-                </a:gs>
-                <a:gs pos="100000">
-                  <a:schemeClr val="accent1">
-                    <a:tint val="44500"/>
-                    <a:satMod val="160000"/>
-                  </a:schemeClr>
-                </a:gs>
-                <a:gs pos="62000">
-                  <a:schemeClr val="accent1">
-                    <a:tint val="23500"/>
-                    <a:satMod val="160000"/>
-                  </a:schemeClr>
-                </a:gs>
-              </a:gsLst>
-              <a:lin ang="5400000" scaled="1"/>
-              <a:tileRect/>
-            </a:gradFill>
-            <a:ln>
-              <a:solidFill>
-                <a:srgbClr val="25FB25"/>
-              </a:solidFill>
-            </a:ln>
+            <a:ln/>
           </p:spPr>
           <p:style>
-            <a:lnRef idx="2">
-              <a:schemeClr val="accent1">
-                <a:shade val="50000"/>
-              </a:schemeClr>
+            <a:lnRef idx="1">
+              <a:schemeClr val="accent4"/>
             </a:lnRef>
-            <a:fillRef idx="1">
-              <a:schemeClr val="accent1"/>
+            <a:fillRef idx="3">
+              <a:schemeClr val="accent4"/>
             </a:fillRef>
-            <a:effectRef idx="0">
-              <a:schemeClr val="accent1"/>
+            <a:effectRef idx="2">
+              <a:schemeClr val="accent4"/>
             </a:effectRef>
             <a:fontRef idx="minor">
               <a:schemeClr val="lt1"/>
@@ -4983,7 +5051,7 @@
               <a:r>
                 <a:rPr kumimoji="1" lang="en-US" altLang="ja-JP" sz="1600" b="1" dirty="0" smtClean="0">
                   <a:solidFill>
-                    <a:schemeClr val="tx1"/>
+                    <a:schemeClr val="bg1"/>
                   </a:solidFill>
                 </a:rPr>
                 <a:t>MyBatis3</a:t>
@@ -4994,7 +5062,7 @@
               <a:r>
                 <a:rPr lang="ja-JP" altLang="en-US" sz="1600" b="1" dirty="0" smtClean="0">
                   <a:solidFill>
-                    <a:schemeClr val="tx1"/>
+                    <a:schemeClr val="bg1"/>
                   </a:solidFill>
                 </a:rPr>
                 <a:t>設定</a:t>
@@ -5002,148 +5070,413 @@
               <a:r>
                 <a:rPr lang="ja-JP" altLang="en-US" sz="1600" b="1" dirty="0">
                   <a:solidFill>
-                    <a:schemeClr val="tx1"/>
+                    <a:schemeClr val="bg1"/>
                   </a:solidFill>
                 </a:rPr>
                 <a:t>ファイル</a:t>
               </a:r>
               <a:endParaRPr kumimoji="1" lang="ja-JP" altLang="en-US" sz="1600" b="1" dirty="0">
                 <a:solidFill>
-                  <a:schemeClr val="tx1"/>
+                  <a:schemeClr val="bg1"/>
                 </a:solidFill>
               </a:endParaRPr>
             </a:p>
           </p:txBody>
         </p:sp>
       </p:grpSp>
-      <p:sp>
-        <p:nvSpPr>
-          <p:cNvPr id="41" name="右矢印 40"/>
+      <p:grpSp>
+        <p:nvGrpSpPr>
+          <p:cNvPr id="52" name="グループ化 51"/>
+          <p:cNvGrpSpPr/>
+          <p:nvPr/>
+        </p:nvGrpSpPr>
+        <p:grpSpPr>
+          <a:xfrm>
+            <a:off x="3317339" y="5661248"/>
+            <a:ext cx="1798778" cy="629110"/>
+            <a:chOff x="5272939" y="853663"/>
+            <a:chExt cx="2197567" cy="821115"/>
+          </a:xfrm>
+        </p:grpSpPr>
+        <p:sp>
+          <p:nvSpPr>
+            <p:cNvPr id="53" name="正方形/長方形 52"/>
+            <p:cNvSpPr/>
+            <p:nvPr/>
+          </p:nvSpPr>
+          <p:spPr>
+            <a:xfrm>
+              <a:off x="5454281" y="1026706"/>
+              <a:ext cx="2016225" cy="648072"/>
+            </a:xfrm>
+            <a:prstGeom prst="rect">
+              <a:avLst/>
+            </a:prstGeom>
+            <a:ln/>
+          </p:spPr>
+          <p:style>
+            <a:lnRef idx="1">
+              <a:schemeClr val="accent4"/>
+            </a:lnRef>
+            <a:fillRef idx="3">
+              <a:schemeClr val="accent4"/>
+            </a:fillRef>
+            <a:effectRef idx="2">
+              <a:schemeClr val="accent4"/>
+            </a:effectRef>
+            <a:fontRef idx="minor">
+              <a:schemeClr val="lt1"/>
+            </a:fontRef>
+          </p:style>
+          <p:txBody>
+            <a:bodyPr rtlCol="0" anchor="ctr"/>
+            <a:lstStyle/>
+            <a:p>
+              <a:pPr algn="ctr"/>
+              <a:endParaRPr kumimoji="1" lang="ja-JP" altLang="en-US" dirty="0">
+                <a:solidFill>
+                  <a:schemeClr val="bg1"/>
+                </a:solidFill>
+              </a:endParaRPr>
+            </a:p>
+          </p:txBody>
+        </p:sp>
+        <p:sp>
+          <p:nvSpPr>
+            <p:cNvPr id="56" name="正方形/長方形 55"/>
+            <p:cNvSpPr/>
+            <p:nvPr/>
+          </p:nvSpPr>
+          <p:spPr>
+            <a:xfrm>
+              <a:off x="5379950" y="936557"/>
+              <a:ext cx="2016224" cy="648072"/>
+            </a:xfrm>
+            <a:prstGeom prst="rect">
+              <a:avLst/>
+            </a:prstGeom>
+            <a:ln/>
+          </p:spPr>
+          <p:style>
+            <a:lnRef idx="1">
+              <a:schemeClr val="accent4"/>
+            </a:lnRef>
+            <a:fillRef idx="3">
+              <a:schemeClr val="accent4"/>
+            </a:fillRef>
+            <a:effectRef idx="2">
+              <a:schemeClr val="accent4"/>
+            </a:effectRef>
+            <a:fontRef idx="minor">
+              <a:schemeClr val="lt1"/>
+            </a:fontRef>
+          </p:style>
+          <p:txBody>
+            <a:bodyPr rtlCol="0" anchor="ctr"/>
+            <a:lstStyle/>
+            <a:p>
+              <a:pPr algn="ctr"/>
+              <a:endParaRPr kumimoji="1" lang="ja-JP" altLang="en-US" dirty="0">
+                <a:solidFill>
+                  <a:schemeClr val="bg1"/>
+                </a:solidFill>
+              </a:endParaRPr>
+            </a:p>
+          </p:txBody>
+        </p:sp>
+        <p:sp>
+          <p:nvSpPr>
+            <p:cNvPr id="57" name="正方形/長方形 56"/>
+            <p:cNvSpPr/>
+            <p:nvPr/>
+          </p:nvSpPr>
+          <p:spPr>
+            <a:xfrm>
+              <a:off x="5272939" y="853663"/>
+              <a:ext cx="2016224" cy="648072"/>
+            </a:xfrm>
+            <a:prstGeom prst="rect">
+              <a:avLst/>
+            </a:prstGeom>
+            <a:ln/>
+          </p:spPr>
+          <p:style>
+            <a:lnRef idx="1">
+              <a:schemeClr val="accent4"/>
+            </a:lnRef>
+            <a:fillRef idx="3">
+              <a:schemeClr val="accent4"/>
+            </a:fillRef>
+            <a:effectRef idx="2">
+              <a:schemeClr val="accent4"/>
+            </a:effectRef>
+            <a:fontRef idx="minor">
+              <a:schemeClr val="lt1"/>
+            </a:fontRef>
+          </p:style>
+          <p:txBody>
+            <a:bodyPr rtlCol="0" anchor="ctr"/>
+            <a:lstStyle/>
+            <a:p>
+              <a:pPr algn="ctr"/>
+              <a:r>
+                <a:rPr kumimoji="1" lang="en-US" altLang="ja-JP" b="1" dirty="0" smtClean="0">
+                  <a:solidFill>
+                    <a:schemeClr val="bg1"/>
+                  </a:solidFill>
+                </a:rPr>
+                <a:t>Bean</a:t>
+              </a:r>
+              <a:r>
+                <a:rPr kumimoji="1" lang="ja-JP" altLang="en-US" b="1" dirty="0" smtClean="0">
+                  <a:solidFill>
+                    <a:schemeClr val="bg1"/>
+                  </a:solidFill>
+                </a:rPr>
+                <a:t>定義</a:t>
+              </a:r>
+              <a:endParaRPr kumimoji="1" lang="en-US" altLang="ja-JP" b="1" dirty="0" smtClean="0">
+                <a:solidFill>
+                  <a:schemeClr val="bg1"/>
+                </a:solidFill>
+              </a:endParaRPr>
+            </a:p>
+            <a:p>
+              <a:pPr algn="ctr"/>
+              <a:r>
+                <a:rPr kumimoji="1" lang="ja-JP" altLang="en-US" b="1" dirty="0" smtClean="0">
+                  <a:solidFill>
+                    <a:schemeClr val="bg1"/>
+                  </a:solidFill>
+                </a:rPr>
+                <a:t>ファイル</a:t>
+              </a:r>
+              <a:endParaRPr kumimoji="1" lang="ja-JP" altLang="en-US" b="1" dirty="0">
+                <a:solidFill>
+                  <a:schemeClr val="bg1"/>
+                </a:solidFill>
+              </a:endParaRPr>
+            </a:p>
+          </p:txBody>
+        </p:sp>
+      </p:grpSp>
+      <p:sp>
+        <p:nvSpPr>
+          <p:cNvPr id="63" name="右矢印 62"/>
           <p:cNvSpPr/>
           <p:nvPr/>
         </p:nvSpPr>
         <p:spPr>
-          <a:xfrm rot="5400000" flipH="1">
-            <a:off x="4975210" y="3875331"/>
-            <a:ext cx="493310" cy="486615"/>
+          <a:xfrm>
+            <a:off x="7019509" y="5514975"/>
+            <a:ext cx="1822019" cy="486381"/>
           </a:xfrm>
           <a:prstGeom prst="rightArrow">
-            <a:avLst>
-              <a:gd name="adj1" fmla="val 40034"/>
-              <a:gd name="adj2" fmla="val 57724"/>
-            </a:avLst>
+            <a:avLst/>
           </a:prstGeom>
           <a:ln/>
         </p:spPr>
         <p:style>
           <a:lnRef idx="1">
-            <a:schemeClr val="accent3"/>
+            <a:schemeClr val="dk1"/>
           </a:lnRef>
-          <a:fillRef idx="3">
-            <a:schemeClr val="accent3"/>
+          <a:fillRef idx="2">
+            <a:schemeClr val="dk1"/>
           </a:fillRef>
-          <a:effectRef idx="2">
-            <a:schemeClr val="accent3"/>
+          <a:effectRef idx="1">
+            <a:schemeClr val="dk1"/>
           </a:effectRef>
           <a:fontRef idx="minor">
-            <a:schemeClr val="lt1"/>
+            <a:schemeClr val="dk1"/>
           </a:fontRef>
         </p:style>
         <p:txBody>
-          <a:bodyPr rtlCol="0" anchor="ctr"/>
+          <a:bodyPr rot="0" spcFirstLastPara="0" vertOverflow="overflow" horzOverflow="overflow" vert="horz" wrap="square" lIns="91440" tIns="45720" rIns="91440" bIns="45720" numCol="1" spcCol="0" rtlCol="0" fromWordArt="0" anchor="ctr" anchorCtr="0" forceAA="0" compatLnSpc="1">
+            <a:prstTxWarp prst="textNoShape">
+              <a:avLst/>
+            </a:prstTxWarp>
+            <a:noAutofit/>
+          </a:bodyPr>
           <a:lstStyle/>
           <a:p>
             <a:pPr algn="ctr"/>
-            <a:endParaRPr kumimoji="1" lang="ja-JP" altLang="en-US" dirty="0"/>
-          </a:p>
-        </p:txBody>
-      </p:sp>
-      <p:sp>
-        <p:nvSpPr>
-          <p:cNvPr id="43" name="四角形吹き出し 42"/>
+            <a:endParaRPr kumimoji="1" lang="ja-JP" altLang="en-US" sz="1400"/>
+          </a:p>
+        </p:txBody>
+      </p:sp>
+      <p:sp>
+        <p:nvSpPr>
+          <p:cNvPr id="64" name="正方形/長方形 63"/>
           <p:cNvSpPr/>
           <p:nvPr/>
         </p:nvSpPr>
         <p:spPr>
           <a:xfrm>
-            <a:off x="4725921" y="5146645"/>
-            <a:ext cx="1705884" cy="360040"/>
-          </a:xfrm>
-          <a:prstGeom prst="wedgeRectCallout">
-            <a:avLst>
-              <a:gd name="adj1" fmla="val -33814"/>
-              <a:gd name="adj2" fmla="val -123959"/>
-            </a:avLst>
+            <a:off x="7380537" y="5639939"/>
+            <a:ext cx="1082348" cy="307777"/>
+          </a:xfrm>
+          <a:prstGeom prst="rect">
+            <a:avLst/>
+          </a:prstGeom>
+        </p:spPr>
+        <p:txBody>
+          <a:bodyPr wrap="none">
+            <a:spAutoFit/>
+          </a:bodyPr>
+          <a:lstStyle/>
+          <a:p>
+            <a:pPr algn="ctr"/>
+            <a:r>
+              <a:rPr lang="ja-JP" altLang="en-US" sz="1400" b="1" dirty="0" smtClean="0"/>
+              <a:t>処理の流れ</a:t>
+            </a:r>
+            <a:endParaRPr lang="ja-JP" altLang="en-US" sz="1400" b="1" dirty="0"/>
+          </a:p>
+        </p:txBody>
+      </p:sp>
+      <p:sp>
+        <p:nvSpPr>
+          <p:cNvPr id="65" name="正方形/長方形 64"/>
+          <p:cNvSpPr/>
+          <p:nvPr/>
+        </p:nvSpPr>
+        <p:spPr>
+          <a:xfrm>
+            <a:off x="5850243" y="5673119"/>
+            <a:ext cx="723275" cy="307777"/>
+          </a:xfrm>
+          <a:prstGeom prst="rect">
+            <a:avLst/>
+          </a:prstGeom>
+        </p:spPr>
+        <p:txBody>
+          <a:bodyPr wrap="none">
+            <a:spAutoFit/>
+          </a:bodyPr>
+          <a:lstStyle/>
+          <a:p>
+            <a:pPr algn="ctr"/>
+            <a:r>
+              <a:rPr lang="en-US" altLang="ja-JP" sz="1400" b="1" dirty="0" smtClean="0"/>
+              <a:t>【</a:t>
+            </a:r>
+            <a:r>
+              <a:rPr lang="ja-JP" altLang="en-US" sz="1400" b="1" dirty="0" smtClean="0"/>
+              <a:t>凡例</a:t>
+            </a:r>
+            <a:r>
+              <a:rPr lang="en-US" altLang="ja-JP" sz="1400" b="1" dirty="0" smtClean="0"/>
+              <a:t>】</a:t>
+            </a:r>
+          </a:p>
+        </p:txBody>
+      </p:sp>
+      <p:cxnSp>
+        <p:nvCxnSpPr>
+          <p:cNvPr id="66" name="直線コネクタ 65"/>
+          <p:cNvCxnSpPr/>
+          <p:nvPr/>
+        </p:nvCxnSpPr>
+        <p:spPr>
+          <a:xfrm flipH="1">
+            <a:off x="4476823" y="1429119"/>
+            <a:ext cx="1" cy="4084182"/>
+          </a:xfrm>
+          <a:prstGeom prst="line">
+            <a:avLst/>
           </a:prstGeom>
           <a:ln>
             <a:solidFill>
-              <a:schemeClr val="tx1"/>
+              <a:schemeClr val="tx1">
+                <a:lumMod val="50000"/>
+                <a:lumOff val="50000"/>
+              </a:schemeClr>
             </a:solidFill>
           </a:ln>
         </p:spPr>
         <p:style>
-          <a:lnRef idx="1">
+          <a:lnRef idx="2">
             <a:schemeClr val="accent1"/>
           </a:lnRef>
-          <a:fillRef idx="2">
+          <a:fillRef idx="0">
             <a:schemeClr val="accent1"/>
           </a:fillRef>
           <a:effectRef idx="1">
             <a:schemeClr val="accent1"/>
           </a:effectRef>
           <a:fontRef idx="minor">
+            <a:schemeClr val="tx1"/>
+          </a:fontRef>
+        </p:style>
+      </p:cxnSp>
+      <p:sp>
+        <p:nvSpPr>
+          <p:cNvPr id="67" name="角丸四角形 66"/>
+          <p:cNvSpPr/>
+          <p:nvPr/>
+        </p:nvSpPr>
+        <p:spPr>
+          <a:xfrm>
+            <a:off x="4399820" y="3817830"/>
+            <a:ext cx="165600" cy="1555386"/>
+          </a:xfrm>
+          <a:prstGeom prst="roundRect">
+            <a:avLst/>
+          </a:prstGeom>
+          <a:ln/>
+        </p:spPr>
+        <p:style>
+          <a:lnRef idx="1">
+            <a:schemeClr val="dk1"/>
+          </a:lnRef>
+          <a:fillRef idx="2">
+            <a:schemeClr val="dk1"/>
+          </a:fillRef>
+          <a:effectRef idx="1">
+            <a:schemeClr val="dk1"/>
+          </a:effectRef>
+          <a:fontRef idx="minor">
             <a:schemeClr val="dk1"/>
           </a:fontRef>
         </p:style>
         <p:txBody>
-          <a:bodyPr rtlCol="0" anchor="ctr"/>
+          <a:bodyPr rot="0" spcFirstLastPara="0" vertOverflow="overflow" horzOverflow="overflow" vert="horz" wrap="square" lIns="91440" tIns="45720" rIns="91440" bIns="45720" numCol="1" spcCol="0" rtlCol="0" fromWordArt="0" anchor="ctr" anchorCtr="0" forceAA="0" compatLnSpc="1">
+            <a:prstTxWarp prst="textNoShape">
+              <a:avLst/>
+            </a:prstTxWarp>
+            <a:noAutofit/>
+          </a:bodyPr>
           <a:lstStyle/>
           <a:p>
             <a:pPr algn="ctr"/>
-            <a:r>
-              <a:rPr lang="en-US" altLang="ja-JP" sz="1200" b="1" dirty="0" smtClean="0"/>
-              <a:t>(3</a:t>
-            </a:r>
-            <a:r>
-              <a:rPr kumimoji="1" lang="en-US" altLang="ja-JP" sz="1200" b="1" dirty="0" smtClean="0"/>
-              <a:t>)MyBatis3</a:t>
-            </a:r>
-            <a:r>
-              <a:rPr lang="ja-JP" altLang="en-US" sz="1200" b="1" dirty="0" smtClean="0"/>
-              <a:t>の設定</a:t>
-            </a:r>
-            <a:endParaRPr kumimoji="1" lang="en-US" altLang="ja-JP" sz="1200" b="1" dirty="0" smtClean="0"/>
-          </a:p>
-        </p:txBody>
-      </p:sp>
-      <p:sp>
-        <p:nvSpPr>
-          <p:cNvPr id="44" name="右矢印 43"/>
+            <a:endParaRPr kumimoji="1" lang="ja-JP" altLang="en-US"/>
+          </a:p>
+        </p:txBody>
+      </p:sp>
+      <p:sp>
+        <p:nvSpPr>
+          <p:cNvPr id="68" name="角丸四角形 67"/>
           <p:cNvSpPr/>
           <p:nvPr/>
         </p:nvSpPr>
         <p:spPr>
-          <a:xfrm rot="5400000" flipH="1">
-            <a:off x="6501116" y="3907441"/>
-            <a:ext cx="493310" cy="486615"/>
-          </a:xfrm>
-          <a:prstGeom prst="rightArrow">
-            <a:avLst>
-              <a:gd name="adj1" fmla="val 40034"/>
-              <a:gd name="adj2" fmla="val 57724"/>
-            </a:avLst>
+          <a:xfrm>
+            <a:off x="3906887" y="516024"/>
+            <a:ext cx="1044525" cy="903570"/>
+          </a:xfrm>
+          <a:prstGeom prst="roundRect">
+            <a:avLst/>
           </a:prstGeom>
-          <a:ln/>
         </p:spPr>
         <p:style>
           <a:lnRef idx="1">
-            <a:schemeClr val="accent3"/>
+            <a:schemeClr val="accent4"/>
           </a:lnRef>
           <a:fillRef idx="3">
-            <a:schemeClr val="accent3"/>
+            <a:schemeClr val="accent4"/>
           </a:fillRef>
           <a:effectRef idx="2">
-            <a:schemeClr val="accent3"/>
+            <a:schemeClr val="accent4"/>
           </a:effectRef>
           <a:fontRef idx="minor">
             <a:schemeClr val="lt1"/>
@@ -5154,66 +5487,174 @@
           <a:lstStyle/>
           <a:p>
             <a:pPr algn="ctr"/>
-            <a:endParaRPr kumimoji="1" lang="ja-JP" altLang="en-US" dirty="0"/>
-          </a:p>
-        </p:txBody>
-      </p:sp>
-      <p:sp>
-        <p:nvSpPr>
-          <p:cNvPr id="46" name="右矢印 45"/>
+            <a:r>
+              <a:rPr lang="en-US" altLang="ja-JP" sz="1600" b="1" dirty="0" smtClean="0"/>
+              <a:t>DTO</a:t>
+            </a:r>
+            <a:endParaRPr lang="en-US" altLang="ja-JP" sz="1600" b="1" dirty="0" smtClean="0"/>
+          </a:p>
+        </p:txBody>
+      </p:sp>
+      <p:sp>
+        <p:nvSpPr>
+          <p:cNvPr id="112" name="正方形/長方形 111"/>
           <p:cNvSpPr/>
           <p:nvPr/>
         </p:nvSpPr>
         <p:spPr>
-          <a:xfrm rot="5400000" flipH="1">
-            <a:off x="5561915" y="2613932"/>
-            <a:ext cx="535312" cy="428346"/>
+          <a:xfrm>
+            <a:off x="4464787" y="4021163"/>
+            <a:ext cx="1399357" cy="338554"/>
+          </a:xfrm>
+          <a:prstGeom prst="rect">
+            <a:avLst/>
+          </a:prstGeom>
+        </p:spPr>
+        <p:txBody>
+          <a:bodyPr wrap="none">
+            <a:spAutoFit/>
+          </a:bodyPr>
+          <a:lstStyle/>
+          <a:p>
+            <a:pPr algn="ctr"/>
+            <a:r>
+              <a:rPr lang="en-US" altLang="ja-JP" sz="1600" b="1" dirty="0" smtClean="0"/>
+              <a:t>(5)DTO</a:t>
+            </a:r>
+            <a:r>
+              <a:rPr lang="ja-JP" altLang="en-US" sz="1600" b="1" dirty="0" smtClean="0"/>
+              <a:t>の作成</a:t>
+            </a:r>
+            <a:endParaRPr lang="en-US" altLang="ja-JP" sz="1600" b="1" dirty="0" smtClean="0"/>
+          </a:p>
+        </p:txBody>
+      </p:sp>
+      <p:sp>
+        <p:nvSpPr>
+          <p:cNvPr id="80" name="正方形/長方形 79"/>
+          <p:cNvSpPr/>
+          <p:nvPr/>
+        </p:nvSpPr>
+        <p:spPr>
+          <a:xfrm>
+            <a:off x="1603882" y="1704518"/>
+            <a:ext cx="1444626" cy="338554"/>
+          </a:xfrm>
+          <a:prstGeom prst="rect">
+            <a:avLst/>
+          </a:prstGeom>
+        </p:spPr>
+        <p:txBody>
+          <a:bodyPr wrap="none">
+            <a:spAutoFit/>
+          </a:bodyPr>
+          <a:lstStyle/>
+          <a:p>
+            <a:pPr algn="ctr"/>
+            <a:r>
+              <a:rPr lang="en-US" altLang="ja-JP" sz="1600" b="1" dirty="0" smtClean="0"/>
+              <a:t>(1</a:t>
+            </a:r>
+            <a:r>
+              <a:rPr lang="en-US" altLang="ja-JP" sz="1600" b="1" dirty="0" smtClean="0"/>
+              <a:t>)</a:t>
+            </a:r>
+            <a:r>
+              <a:rPr lang="ja-JP" altLang="en-US" sz="1600" b="1" dirty="0" smtClean="0"/>
+              <a:t>メソッド呼出</a:t>
+            </a:r>
+            <a:endParaRPr lang="ja-JP" altLang="en-US" sz="1600" b="1" dirty="0"/>
+          </a:p>
+        </p:txBody>
+      </p:sp>
+      <p:sp>
+        <p:nvSpPr>
+          <p:cNvPr id="89" name="右矢印 88"/>
+          <p:cNvSpPr/>
+          <p:nvPr/>
+        </p:nvSpPr>
+        <p:spPr>
+          <a:xfrm>
+            <a:off x="3289609" y="2172405"/>
+            <a:ext cx="2272387" cy="295200"/>
           </a:xfrm>
           <a:prstGeom prst="rightArrow">
             <a:avLst/>
           </a:prstGeom>
-          <a:solidFill>
-            <a:srgbClr val="FFFF00"/>
-          </a:solidFill>
-          <a:ln>
-            <a:solidFill>
-              <a:srgbClr val="FFFF00"/>
-            </a:solidFill>
-          </a:ln>
+          <a:ln/>
         </p:spPr>
         <p:style>
           <a:lnRef idx="1">
-            <a:schemeClr val="accent3"/>
+            <a:schemeClr val="dk1"/>
           </a:lnRef>
           <a:fillRef idx="2">
-            <a:schemeClr val="accent3"/>
+            <a:schemeClr val="dk1"/>
           </a:fillRef>
           <a:effectRef idx="1">
-            <a:schemeClr val="accent3"/>
+            <a:schemeClr val="dk1"/>
           </a:effectRef>
           <a:fontRef idx="minor">
             <a:schemeClr val="dk1"/>
           </a:fontRef>
         </p:style>
         <p:txBody>
-          <a:bodyPr rtlCol="0" anchor="ctr"/>
+          <a:bodyPr rot="0" spcFirstLastPara="0" vertOverflow="overflow" horzOverflow="overflow" vert="horz" wrap="square" lIns="91440" tIns="45720" rIns="91440" bIns="45720" numCol="1" spcCol="0" rtlCol="0" fromWordArt="0" anchor="ctr" anchorCtr="0" forceAA="0" compatLnSpc="1">
+            <a:prstTxWarp prst="textNoShape">
+              <a:avLst/>
+            </a:prstTxWarp>
+            <a:noAutofit/>
+          </a:bodyPr>
           <a:lstStyle/>
           <a:p>
             <a:pPr algn="ctr"/>
-            <a:endParaRPr kumimoji="1" lang="ja-JP" altLang="en-US" dirty="0"/>
-          </a:p>
-        </p:txBody>
-      </p:sp>
-      <p:sp>
-        <p:nvSpPr>
-          <p:cNvPr id="47" name="右矢印 46"/>
+            <a:endParaRPr kumimoji="1" lang="ja-JP" altLang="en-US"/>
+          </a:p>
+        </p:txBody>
+      </p:sp>
+      <p:sp>
+        <p:nvSpPr>
+          <p:cNvPr id="71" name="正方形/長方形 70"/>
           <p:cNvSpPr/>
           <p:nvPr/>
         </p:nvSpPr>
         <p:spPr>
-          <a:xfrm rot="9166076" flipH="1">
-            <a:off x="3196844" y="3848691"/>
-            <a:ext cx="1418422" cy="428346"/>
+          <a:xfrm>
+            <a:off x="3261253" y="1873795"/>
+            <a:ext cx="1444626" cy="338554"/>
+          </a:xfrm>
+          <a:prstGeom prst="rect">
+            <a:avLst/>
+          </a:prstGeom>
+        </p:spPr>
+        <p:txBody>
+          <a:bodyPr wrap="none">
+            <a:spAutoFit/>
+          </a:bodyPr>
+          <a:lstStyle/>
+          <a:p>
+            <a:pPr algn="ctr"/>
+            <a:r>
+              <a:rPr lang="en-US" altLang="ja-JP" sz="1600" b="1" dirty="0" smtClean="0"/>
+              <a:t>(2)</a:t>
+            </a:r>
+            <a:r>
+              <a:rPr lang="ja-JP" altLang="en-US" sz="1600" b="1" dirty="0" smtClean="0"/>
+              <a:t>メソッド実行</a:t>
+            </a:r>
+            <a:endParaRPr lang="ja-JP" altLang="en-US" sz="1600" b="1" dirty="0"/>
+          </a:p>
+        </p:txBody>
+      </p:sp>
+      <p:sp>
+        <p:nvSpPr>
+          <p:cNvPr id="77" name="右矢印 76"/>
+          <p:cNvSpPr/>
+          <p:nvPr/>
+        </p:nvSpPr>
+        <p:spPr>
+          <a:xfrm>
+            <a:off x="1648203" y="4800460"/>
+            <a:ext cx="2762818" cy="295275"/>
           </a:xfrm>
           <a:prstGeom prst="rightArrow">
             <a:avLst/>
@@ -5222,95 +5663,83 @@
         </p:spPr>
         <p:style>
           <a:lnRef idx="1">
-            <a:schemeClr val="accent1"/>
-          </a:lnRef>
-          <a:fillRef idx="3">
-            <a:schemeClr val="accent1"/>
-          </a:fillRef>
-          <a:effectRef idx="2">
-            <a:schemeClr val="accent1"/>
-          </a:effectRef>
-          <a:fontRef idx="minor">
-            <a:schemeClr val="lt1"/>
-          </a:fontRef>
-        </p:style>
-        <p:txBody>
-          <a:bodyPr rtlCol="0" anchor="ctr"/>
-          <a:lstStyle/>
-          <a:p>
-            <a:pPr algn="ctr"/>
-            <a:endParaRPr kumimoji="1" lang="ja-JP" altLang="en-US" dirty="0"/>
-          </a:p>
-        </p:txBody>
-      </p:sp>
-      <p:sp>
-        <p:nvSpPr>
-          <p:cNvPr id="48" name="四角形吹き出し 47"/>
-          <p:cNvSpPr/>
-          <p:nvPr/>
-        </p:nvSpPr>
-        <p:spPr>
-          <a:xfrm>
-            <a:off x="2639204" y="3104964"/>
-            <a:ext cx="1705884" cy="360040"/>
-          </a:xfrm>
-          <a:prstGeom prst="wedgeRectCallout">
-            <a:avLst>
-              <a:gd name="adj1" fmla="val 36912"/>
-              <a:gd name="adj2" fmla="val 119431"/>
-            </a:avLst>
-          </a:prstGeom>
-          <a:ln>
-            <a:solidFill>
-              <a:schemeClr val="tx1"/>
-            </a:solidFill>
-          </a:ln>
-        </p:spPr>
-        <p:style>
-          <a:lnRef idx="1">
-            <a:schemeClr val="accent1"/>
+            <a:schemeClr val="dk1"/>
           </a:lnRef>
           <a:fillRef idx="2">
-            <a:schemeClr val="accent1"/>
+            <a:schemeClr val="dk1"/>
           </a:fillRef>
           <a:effectRef idx="1">
-            <a:schemeClr val="accent1"/>
+            <a:schemeClr val="dk1"/>
           </a:effectRef>
           <a:fontRef idx="minor">
             <a:schemeClr val="dk1"/>
           </a:fontRef>
         </p:style>
         <p:txBody>
-          <a:bodyPr rtlCol="0" anchor="ctr"/>
+          <a:bodyPr rot="0" spcFirstLastPara="0" vertOverflow="overflow" horzOverflow="overflow" vert="horz" wrap="square" lIns="91440" tIns="45720" rIns="91440" bIns="45720" numCol="1" spcCol="0" rtlCol="0" fromWordArt="0" anchor="ctr" anchorCtr="0" forceAA="0" compatLnSpc="1">
+            <a:prstTxWarp prst="textNoShape">
+              <a:avLst/>
+            </a:prstTxWarp>
+            <a:noAutofit/>
+          </a:bodyPr>
           <a:lstStyle/>
           <a:p>
             <a:pPr algn="ctr"/>
-            <a:r>
-              <a:rPr kumimoji="1" lang="en-US" altLang="ja-JP" sz="1200" b="1" dirty="0" smtClean="0"/>
-              <a:t>(2)</a:t>
-            </a:r>
-            <a:r>
-              <a:rPr kumimoji="1" lang="ja-JP" altLang="en-US" sz="1200" b="1" dirty="0" smtClean="0"/>
-              <a:t>データソース</a:t>
-            </a:r>
-            <a:r>
-              <a:rPr lang="ja-JP" altLang="en-US" sz="1200" b="1" dirty="0" smtClean="0"/>
-              <a:t>の設定</a:t>
-            </a:r>
-            <a:endParaRPr kumimoji="1" lang="en-US" altLang="ja-JP" sz="1200" b="1" dirty="0" smtClean="0"/>
+            <a:endParaRPr kumimoji="1" lang="ja-JP" altLang="en-US"/>
+          </a:p>
+        </p:txBody>
+      </p:sp>
+      <p:sp>
+        <p:nvSpPr>
+          <p:cNvPr id="97" name="正方形/長方形 96"/>
+          <p:cNvSpPr/>
+          <p:nvPr/>
+        </p:nvSpPr>
+        <p:spPr>
+          <a:xfrm>
+            <a:off x="1672473" y="4477485"/>
+            <a:ext cx="1399358" cy="338554"/>
+          </a:xfrm>
+          <a:prstGeom prst="rect">
+            <a:avLst/>
+          </a:prstGeom>
+        </p:spPr>
+        <p:txBody>
+          <a:bodyPr wrap="none">
+            <a:spAutoFit/>
+          </a:bodyPr>
+          <a:lstStyle/>
+          <a:p>
+            <a:pPr algn="ctr"/>
+            <a:r>
+              <a:rPr lang="en-US" altLang="ja-JP" sz="1600" b="1" dirty="0" smtClean="0"/>
+              <a:t>(6)DTO</a:t>
+            </a:r>
+            <a:r>
+              <a:rPr lang="ja-JP" altLang="en-US" sz="1600" b="1" dirty="0" smtClean="0"/>
+              <a:t>の利用</a:t>
+            </a:r>
+            <a:endParaRPr lang="en-US" altLang="ja-JP" sz="1600" b="1" dirty="0" smtClean="0"/>
           </a:p>
         </p:txBody>
       </p:sp>
     </p:spTree>
     <p:extLst>
       <p:ext uri="{BB962C8B-B14F-4D97-AF65-F5344CB8AC3E}">
-        <p14:creationId xmlns:p14="http://schemas.microsoft.com/office/powerpoint/2010/main" val="3850715801"/>
+        <p14:creationId xmlns:p14="http://schemas.microsoft.com/office/powerpoint/2010/main" val="847283225"/>
       </p:ext>
     </p:extLst>
   </p:cSld>
   <p:clrMapOvr>
     <a:masterClrMapping/>
   </p:clrMapOvr>
+  <p:timing>
+    <p:tnLst>
+      <p:par>
+        <p:cTn id="1" dur="indefinite" restart="never" nodeType="tmRoot"/>
+      </p:par>
+    </p:tnLst>
+  </p:timing>
 </p:sld>
 </file>
 
@@ -5597,4 +6026,289 @@
   <a:objectDefaults/>
   <a:extraClrSchemeLst/>
 </a:theme>
+</file>
+
+<file path=ppt/theme/theme2.xml><?xml version="1.0" encoding="utf-8"?>
+<a:theme xmlns:a="http://schemas.openxmlformats.org/drawingml/2006/main" name="Office ​​テーマ">
+  <a:themeElements>
+    <a:clrScheme name="Office">
+      <a:dk1>
+        <a:sysClr val="windowText" lastClr="000000"/>
+      </a:dk1>
+      <a:lt1>
+        <a:sysClr val="window" lastClr="FFFFFF"/>
+      </a:lt1>
+      <a:dk2>
+        <a:srgbClr val="1F497D"/>
+      </a:dk2>
+      <a:lt2>
+        <a:srgbClr val="EEECE1"/>
+      </a:lt2>
+      <a:accent1>
+        <a:srgbClr val="4F81BD"/>
+      </a:accent1>
+      <a:accent2>
+        <a:srgbClr val="C0504D"/>
+      </a:accent2>
+      <a:accent3>
+        <a:srgbClr val="9BBB59"/>
+      </a:accent3>
+      <a:accent4>
+        <a:srgbClr val="8064A2"/>
+      </a:accent4>
+      <a:accent5>
+        <a:srgbClr val="4BACC6"/>
+      </a:accent5>
+      <a:accent6>
+        <a:srgbClr val="F79646"/>
+      </a:accent6>
+      <a:hlink>
+        <a:srgbClr val="0000FF"/>
+      </a:hlink>
+      <a:folHlink>
+        <a:srgbClr val="800080"/>
+      </a:folHlink>
+    </a:clrScheme>
+    <a:fontScheme name="Office">
+      <a:majorFont>
+        <a:latin typeface="Calibri"/>
+        <a:ea typeface=""/>
+        <a:cs typeface=""/>
+        <a:font script="Jpan" typeface="ＭＳ Ｐゴシック"/>
+        <a:font script="Hang" typeface="맑은 고딕"/>
+        <a:font script="Hans" typeface="宋体"/>
+        <a:font script="Hant" typeface="新細明體"/>
+        <a:font script="Arab" typeface="Times New Roman"/>
+        <a:font script="Hebr" typeface="Times New Roman"/>
+        <a:font script="Thai" typeface="Angsana New"/>
+        <a:font script="Ethi" typeface="Nyala"/>
+        <a:font script="Beng" typeface="Vrinda"/>
+        <a:font script="Gujr" typeface="Shruti"/>
+        <a:font script="Khmr" typeface="MoolBoran"/>
+        <a:font script="Knda" typeface="Tunga"/>
+        <a:font script="Guru" typeface="Raavi"/>
+        <a:font script="Cans" typeface="Euphemia"/>
+        <a:font script="Cher" typeface="Plantagenet Cherokee"/>
+        <a:font script="Yiii" typeface="Microsoft Yi Baiti"/>
+        <a:font script="Tibt" typeface="Microsoft Himalaya"/>
+        <a:font script="Thaa" typeface="MV Boli"/>
+        <a:font script="Deva" typeface="Mangal"/>
+        <a:font script="Telu" typeface="Gautami"/>
+        <a:font script="Taml" typeface="Latha"/>
+        <a:font script="Syrc" typeface="Estrangelo Edessa"/>
+        <a:font script="Orya" typeface="Kalinga"/>
+        <a:font script="Mlym" typeface="Kartika"/>
+        <a:font script="Laoo" typeface="DokChampa"/>
+        <a:font script="Sinh" typeface="Iskoola Pota"/>
+        <a:font script="Mong" typeface="Mongolian Baiti"/>
+        <a:font script="Viet" typeface="Times New Roman"/>
+        <a:font script="Uigh" typeface="Microsoft Uighur"/>
+        <a:font script="Geor" typeface="Sylfaen"/>
+      </a:majorFont>
+      <a:minorFont>
+        <a:latin typeface="Calibri"/>
+        <a:ea typeface=""/>
+        <a:cs typeface=""/>
+        <a:font script="Jpan" typeface="ＭＳ Ｐゴシック"/>
+        <a:font script="Hang" typeface="맑은 고딕"/>
+        <a:font script="Hans" typeface="宋体"/>
+        <a:font script="Hant" typeface="新細明體"/>
+        <a:font script="Arab" typeface="Arial"/>
+        <a:font script="Hebr" typeface="Arial"/>
+        <a:font script="Thai" typeface="Cordia New"/>
+        <a:font script="Ethi" typeface="Nyala"/>
+        <a:font script="Beng" typeface="Vrinda"/>
+        <a:font script="Gujr" typeface="Shruti"/>
+        <a:font script="Khmr" typeface="DaunPenh"/>
+        <a:font script="Knda" typeface="Tunga"/>
+        <a:font script="Guru" typeface="Raavi"/>
+        <a:font script="Cans" typeface="Euphemia"/>
+        <a:font script="Cher" typeface="Plantagenet Cherokee"/>
+        <a:font script="Yiii" typeface="Microsoft Yi Baiti"/>
+        <a:font script="Tibt" typeface="Microsoft Himalaya"/>
+        <a:font script="Thaa" typeface="MV Boli"/>
+        <a:font script="Deva" typeface="Mangal"/>
+        <a:font script="Telu" typeface="Gautami"/>
+        <a:font script="Taml" typeface="Latha"/>
+        <a:font script="Syrc" typeface="Estrangelo Edessa"/>
+        <a:font script="Orya" typeface="Kalinga"/>
+        <a:font script="Mlym" typeface="Kartika"/>
+        <a:font script="Laoo" typeface="DokChampa"/>
+        <a:font script="Sinh" typeface="Iskoola Pota"/>
+        <a:font script="Mong" typeface="Mongolian Baiti"/>
+        <a:font script="Viet" typeface="Arial"/>
+        <a:font script="Uigh" typeface="Microsoft Uighur"/>
+        <a:font script="Geor" typeface="Sylfaen"/>
+      </a:minorFont>
+    </a:fontScheme>
+    <a:fmtScheme name="Office">
+      <a:fillStyleLst>
+        <a:solidFill>
+          <a:schemeClr val="phClr"/>
+        </a:solidFill>
+        <a:gradFill rotWithShape="1">
+          <a:gsLst>
+            <a:gs pos="0">
+              <a:schemeClr val="phClr">
+                <a:tint val="50000"/>
+                <a:satMod val="300000"/>
+              </a:schemeClr>
+            </a:gs>
+            <a:gs pos="35000">
+              <a:schemeClr val="phClr">
+                <a:tint val="37000"/>
+                <a:satMod val="300000"/>
+              </a:schemeClr>
+            </a:gs>
+            <a:gs pos="100000">
+              <a:schemeClr val="phClr">
+                <a:tint val="15000"/>
+                <a:satMod val="350000"/>
+              </a:schemeClr>
+            </a:gs>
+          </a:gsLst>
+          <a:lin ang="16200000" scaled="1"/>
+        </a:gradFill>
+        <a:gradFill rotWithShape="1">
+          <a:gsLst>
+            <a:gs pos="0">
+              <a:schemeClr val="phClr">
+                <a:shade val="51000"/>
+                <a:satMod val="130000"/>
+              </a:schemeClr>
+            </a:gs>
+            <a:gs pos="80000">
+              <a:schemeClr val="phClr">
+                <a:shade val="93000"/>
+                <a:satMod val="130000"/>
+              </a:schemeClr>
+            </a:gs>
+            <a:gs pos="100000">
+              <a:schemeClr val="phClr">
+                <a:shade val="94000"/>
+                <a:satMod val="135000"/>
+              </a:schemeClr>
+            </a:gs>
+          </a:gsLst>
+          <a:lin ang="16200000" scaled="0"/>
+        </a:gradFill>
+      </a:fillStyleLst>
+      <a:lnStyleLst>
+        <a:ln w="9525" cap="flat" cmpd="sng" algn="ctr">
+          <a:solidFill>
+            <a:schemeClr val="phClr">
+              <a:shade val="95000"/>
+              <a:satMod val="105000"/>
+            </a:schemeClr>
+          </a:solidFill>
+          <a:prstDash val="solid"/>
+        </a:ln>
+        <a:ln w="25400" cap="flat" cmpd="sng" algn="ctr">
+          <a:solidFill>
+            <a:schemeClr val="phClr"/>
+          </a:solidFill>
+          <a:prstDash val="solid"/>
+        </a:ln>
+        <a:ln w="38100" cap="flat" cmpd="sng" algn="ctr">
+          <a:solidFill>
+            <a:schemeClr val="phClr"/>
+          </a:solidFill>
+          <a:prstDash val="solid"/>
+        </a:ln>
+      </a:lnStyleLst>
+      <a:effectStyleLst>
+        <a:effectStyle>
+          <a:effectLst>
+            <a:outerShdw blurRad="40000" dist="20000" dir="5400000" rotWithShape="0">
+              <a:srgbClr val="000000">
+                <a:alpha val="38000"/>
+              </a:srgbClr>
+            </a:outerShdw>
+          </a:effectLst>
+        </a:effectStyle>
+        <a:effectStyle>
+          <a:effectLst>
+            <a:outerShdw blurRad="40000" dist="23000" dir="5400000" rotWithShape="0">
+              <a:srgbClr val="000000">
+                <a:alpha val="35000"/>
+              </a:srgbClr>
+            </a:outerShdw>
+          </a:effectLst>
+        </a:effectStyle>
+        <a:effectStyle>
+          <a:effectLst>
+            <a:outerShdw blurRad="40000" dist="23000" dir="5400000" rotWithShape="0">
+              <a:srgbClr val="000000">
+                <a:alpha val="35000"/>
+              </a:srgbClr>
+            </a:outerShdw>
+          </a:effectLst>
+          <a:scene3d>
+            <a:camera prst="orthographicFront">
+              <a:rot lat="0" lon="0" rev="0"/>
+            </a:camera>
+            <a:lightRig rig="threePt" dir="t">
+              <a:rot lat="0" lon="0" rev="1200000"/>
+            </a:lightRig>
+          </a:scene3d>
+          <a:sp3d>
+            <a:bevelT w="63500" h="25400"/>
+          </a:sp3d>
+        </a:effectStyle>
+      </a:effectStyleLst>
+      <a:bgFillStyleLst>
+        <a:solidFill>
+          <a:schemeClr val="phClr"/>
+        </a:solidFill>
+        <a:gradFill rotWithShape="1">
+          <a:gsLst>
+            <a:gs pos="0">
+              <a:schemeClr val="phClr">
+                <a:tint val="40000"/>
+                <a:satMod val="350000"/>
+              </a:schemeClr>
+            </a:gs>
+            <a:gs pos="40000">
+              <a:schemeClr val="phClr">
+                <a:tint val="45000"/>
+                <a:shade val="99000"/>
+                <a:satMod val="350000"/>
+              </a:schemeClr>
+            </a:gs>
+            <a:gs pos="100000">
+              <a:schemeClr val="phClr">
+                <a:shade val="20000"/>
+                <a:satMod val="255000"/>
+              </a:schemeClr>
+            </a:gs>
+          </a:gsLst>
+          <a:path path="circle">
+            <a:fillToRect l="50000" t="-80000" r="50000" b="180000"/>
+          </a:path>
+        </a:gradFill>
+        <a:gradFill rotWithShape="1">
+          <a:gsLst>
+            <a:gs pos="0">
+              <a:schemeClr val="phClr">
+                <a:tint val="80000"/>
+                <a:satMod val="300000"/>
+              </a:schemeClr>
+            </a:gs>
+            <a:gs pos="100000">
+              <a:schemeClr val="phClr">
+                <a:shade val="30000"/>
+                <a:satMod val="200000"/>
+              </a:schemeClr>
+            </a:gs>
+          </a:gsLst>
+          <a:path path="circle">
+            <a:fillToRect l="50000" t="50000" r="50000" b="50000"/>
+          </a:path>
+        </a:gradFill>
+      </a:bgFillStyleLst>
+    </a:fmtScheme>
+  </a:themeElements>
+  <a:objectDefaults/>
+  <a:extraClrSchemeLst/>
+</a:theme>
 </file>
</xml_diff>